<commit_message>
Adding per Jeff M UGP-5635
</commit_message>
<xml_diff>
--- a/help/data-sheets/assets/BusinessSupportDatasheet.pptx
+++ b/help/data-sheets/assets/BusinessSupportDatasheet.pptx
@@ -368,7 +368,7 @@
           <a:p>
             <a:fld id="{FB81873C-0B24-F04A-98A1-90E0A78F7E8A}" type="datetimeFigureOut">
               <a:rPr lang="en-US" smtClean="0"/>
-              <a:t>9/22/2021</a:t>
+              <a:t>10/1/2021</a:t>
             </a:fld>
             <a:endParaRPr lang="en-US"/>
           </a:p>
@@ -991,7 +991,7 @@
           <a:p>
             <a:fld id="{1D8BD707-D9CF-40AE-B4C6-C98DA3205C09}" type="datetimeFigureOut">
               <a:rPr lang="en-US"/>
-              <a:t>9/22/2021</a:t>
+              <a:t>10/1/2021</a:t>
             </a:fld>
             <a:endParaRPr lang="en-US"/>
           </a:p>
@@ -1183,7 +1183,7 @@
           <a:p>
             <a:fld id="{1D8BD707-D9CF-40AE-B4C6-C98DA3205C09}" type="datetimeFigureOut">
               <a:rPr lang="en-US"/>
-              <a:t>9/22/2021</a:t>
+              <a:t>10/1/2021</a:t>
             </a:fld>
             <a:endParaRPr lang="en-US"/>
           </a:p>
@@ -1501,7 +1501,7 @@
           <a:p>
             <a:fld id="{1D8BD707-D9CF-40AE-B4C6-C98DA3205C09}" type="datetimeFigureOut">
               <a:rPr lang="en-US"/>
-              <a:t>9/22/2021</a:t>
+              <a:t>10/1/2021</a:t>
             </a:fld>
             <a:endParaRPr lang="en-US"/>
           </a:p>
@@ -1756,7 +1756,7 @@
         <p:spPr>
           <a:xfrm>
             <a:off x="168565" y="7162363"/>
-            <a:ext cx="2800350" cy="238760"/>
+            <a:ext cx="4032732" cy="227626"/>
           </a:xfrm>
           <a:prstGeom prst="rect">
             <a:avLst/>
@@ -1777,7 +1777,7 @@
               </a:spcBef>
             </a:pPr>
             <a:r>
-              <a:rPr sz="1400" b="1" u="heavy" spc="10">
+              <a:rPr lang="it-IT" sz="1400" b="1" u="heavy" dirty="0">
                 <a:solidFill>
                   <a:srgbClr val="020302"/>
                 </a:solidFill>
@@ -1789,87 +1789,8 @@
                 <a:latin typeface="Adobe Clean"/>
                 <a:cs typeface="Adobe Clean"/>
               </a:rPr>
-              <a:t>Service </a:t>
+              <a:t>Obiettivi del livello di servizio: risposta iniziale</a:t>
             </a:r>
-            <a:r>
-              <a:rPr sz="1400" b="1" u="heavy" spc="-10">
-                <a:solidFill>
-                  <a:srgbClr val="020302"/>
-                </a:solidFill>
-                <a:uFill>
-                  <a:solidFill>
-                    <a:srgbClr val="020302"/>
-                  </a:solidFill>
-                </a:uFill>
-                <a:latin typeface="Adobe Clean"/>
-                <a:cs typeface="Adobe Clean"/>
-              </a:rPr>
-              <a:t>Level </a:t>
-            </a:r>
-            <a:r>
-              <a:rPr sz="1400" b="1" u="heavy" spc="-45">
-                <a:solidFill>
-                  <a:srgbClr val="020302"/>
-                </a:solidFill>
-                <a:uFill>
-                  <a:solidFill>
-                    <a:srgbClr val="020302"/>
-                  </a:solidFill>
-                </a:uFill>
-                <a:latin typeface="Adobe Clean"/>
-                <a:cs typeface="Adobe Clean"/>
-              </a:rPr>
-              <a:t>Targets: </a:t>
-            </a:r>
-            <a:r>
-              <a:rPr sz="1400" b="1" u="heavy" spc="-10">
-                <a:solidFill>
-                  <a:srgbClr val="020302"/>
-                </a:solidFill>
-                <a:uFill>
-                  <a:solidFill>
-                    <a:srgbClr val="020302"/>
-                  </a:solidFill>
-                </a:uFill>
-                <a:latin typeface="Adobe Clean"/>
-                <a:cs typeface="Adobe Clean"/>
-              </a:rPr>
-              <a:t>Initial</a:t>
-            </a:r>
-            <a:r>
-              <a:rPr sz="1400" b="1" u="heavy" spc="-140">
-                <a:solidFill>
-                  <a:srgbClr val="020302"/>
-                </a:solidFill>
-                <a:uFill>
-                  <a:solidFill>
-                    <a:srgbClr val="020302"/>
-                  </a:solidFill>
-                </a:uFill>
-                <a:latin typeface="Adobe Clean"/>
-                <a:cs typeface="Adobe Clean"/>
-              </a:rPr>
-              <a:t> </a:t>
-            </a:r>
-            <a:r>
-              <a:rPr sz="1400" b="1" u="heavy" spc="-15">
-                <a:solidFill>
-                  <a:srgbClr val="020302"/>
-                </a:solidFill>
-                <a:uFill>
-                  <a:solidFill>
-                    <a:srgbClr val="020302"/>
-                  </a:solidFill>
-                </a:uFill>
-                <a:latin typeface="Adobe Clean"/>
-                <a:cs typeface="Adobe Clean"/>
-              </a:rPr>
-              <a:t>Response</a:t>
-            </a:r>
-            <a:endParaRPr sz="1400">
-              <a:latin typeface="Adobe Clean"/>
-              <a:cs typeface="Adobe Clean"/>
-            </a:endParaRPr>
           </a:p>
         </p:txBody>
       </p:sp>
@@ -1936,20 +1857,11 @@
               </a:spcBef>
             </a:pPr>
             <a:r>
-              <a:rPr sz="2300">
+              <a:rPr lang="it-IT" sz="2300">
                 <a:latin typeface="Adobe Clean" panose="020B0503020404020204" pitchFamily="34" charset="0"/>
               </a:rPr>
-              <a:t>ADOBE </a:t>
+              <a:t>OPZIONI DI SUPPORTO ADOBE</a:t>
             </a:r>
-            <a:r>
-              <a:rPr lang="en-US" sz="2300">
-                <a:latin typeface="Adobe Clean" panose="020B0503020404020204" pitchFamily="34" charset="0"/>
-              </a:rPr>
-              <a:t>SUPPORT OFFERINGS</a:t>
-            </a:r>
-            <a:endParaRPr sz="2300">
-              <a:latin typeface="Adobe Clean" panose="020B0503020404020204" pitchFamily="34" charset="0"/>
-            </a:endParaRPr>
           </a:p>
         </p:txBody>
       </p:sp>
@@ -1983,7 +1895,7 @@
               </a:spcBef>
             </a:pPr>
             <a:r>
-              <a:rPr lang="en-US" sz="900">
+              <a:rPr lang="it-IT" sz="900" dirty="0">
                 <a:solidFill>
                   <a:schemeClr val="bg1"/>
                 </a:solidFill>
@@ -1992,7 +1904,7 @@
               <a:t>Online | </a:t>
             </a:r>
             <a:r>
-              <a:rPr lang="en-US" sz="900" b="1">
+              <a:rPr lang="it-IT" sz="900" b="1" dirty="0">
                 <a:solidFill>
                   <a:schemeClr val="bg1"/>
                 </a:solidFill>
@@ -2001,7 +1913,7 @@
               <a:t>Business</a:t>
             </a:r>
             <a:r>
-              <a:rPr lang="en-US" sz="900">
+              <a:rPr lang="it-IT" sz="900" dirty="0">
                 <a:solidFill>
                   <a:schemeClr val="bg1"/>
                 </a:solidFill>
@@ -2020,21 +1932,65 @@
               </a:spcBef>
             </a:pPr>
             <a:r>
-              <a:rPr lang="en-US" sz="900">
+              <a:rPr lang="it-IT" sz="900" dirty="0">
                 <a:solidFill>
                   <a:schemeClr val="bg1"/>
                 </a:solidFill>
                 <a:latin typeface="Adobe Clean SemiLight" panose="020B0403020404020204" pitchFamily="34" charset="0"/>
               </a:rPr>
-              <a:t>Adobe provides a comprehensive range of technical resources to help support your business, included as part of your Experience Cloud license subscription and enhanced in the BUSINESS support package. BUSINESS support includes access to personalized learning paths and monitored community forums via the Adobe Experience League. You can also take advantage of our detailed and in-depth technical product documentation and current release notes. BUSINESS customers also benefit from access to our technical support teams for any product query via either the telephone or the support web portal, to help protect your business at the most critical times. BUSINESS customers will receive regular communications and updates from their Account Support Lead in addition to support case escalation management for your most critical of support requests. </a:t>
+              <a:t>Adobe offre una gamma completa di risorse tecniche per assistere la tua azienda, incluse nell’abbonamento Experience Cloud </a:t>
             </a:r>
-            <a:endParaRPr lang="en-US" sz="900">
-              <a:solidFill>
-                <a:schemeClr val="bg1"/>
-              </a:solidFill>
-              <a:latin typeface="Adobe Clean Light" panose="020B0303020404020204" pitchFamily="34" charset="0"/>
-              <a:cs typeface="AdobeClean-Light"/>
-            </a:endParaRPr>
+            <a:br>
+              <a:rPr lang="sk-SK" sz="900" dirty="0">
+                <a:solidFill>
+                  <a:schemeClr val="bg1"/>
+                </a:solidFill>
+                <a:latin typeface="Adobe Clean SemiLight" panose="020B0403020404020204" pitchFamily="34" charset="0"/>
+              </a:rPr>
+            </a:br>
+            <a:r>
+              <a:rPr lang="it-IT" sz="900" dirty="0">
+                <a:solidFill>
+                  <a:schemeClr val="bg1"/>
+                </a:solidFill>
+                <a:latin typeface="Adobe Clean SemiLight" panose="020B0403020404020204" pitchFamily="34" charset="0"/>
+              </a:rPr>
+              <a:t>e ampliabili con un pacchetto di supporto BUSINESS. Il supporto BUSINESS include l’accesso a percorsi di apprendimento personalizzati e forum della community monitorati tramite Adobe Experience League. Puoi inoltre usufruire di documentazione tecnica dettagliata e note sulla versione sempre aggiornate. I clienti BUSINESS possono anche contattare, tramite telefono </a:t>
+            </a:r>
+            <a:br>
+              <a:rPr lang="sk-SK" sz="900" dirty="0">
+                <a:solidFill>
+                  <a:schemeClr val="bg1"/>
+                </a:solidFill>
+                <a:latin typeface="Adobe Clean SemiLight" panose="020B0403020404020204" pitchFamily="34" charset="0"/>
+              </a:rPr>
+            </a:br>
+            <a:r>
+              <a:rPr lang="it-IT" sz="900" dirty="0">
+                <a:solidFill>
+                  <a:schemeClr val="bg1"/>
+                </a:solidFill>
+                <a:latin typeface="Adobe Clean SemiLight" panose="020B0403020404020204" pitchFamily="34" charset="0"/>
+              </a:rPr>
+              <a:t>o portale web, i team addetti al supporto tecnico, per ricevere assistenza nei momenti più critici. I clienti BUSINESS riceveranno comunicazioni e aggiornamenti regolari dal proprio Account Support Lead, nonché la gestione delle escalation per le richieste </a:t>
+            </a:r>
+            <a:br>
+              <a:rPr lang="sk-SK" sz="900" dirty="0">
+                <a:solidFill>
+                  <a:schemeClr val="bg1"/>
+                </a:solidFill>
+                <a:latin typeface="Adobe Clean SemiLight" panose="020B0403020404020204" pitchFamily="34" charset="0"/>
+              </a:rPr>
+            </a:br>
+            <a:r>
+              <a:rPr lang="it-IT" sz="900" dirty="0">
+                <a:solidFill>
+                  <a:schemeClr val="bg1"/>
+                </a:solidFill>
+                <a:latin typeface="Adobe Clean SemiLight" panose="020B0403020404020204" pitchFamily="34" charset="0"/>
+              </a:rPr>
+              <a:t>di supporto più critiche. </a:t>
+            </a:r>
           </a:p>
         </p:txBody>
       </p:sp>
@@ -2101,24 +2057,8 @@
               </a:spcBef>
             </a:pPr>
             <a:r>
-              <a:rPr spc="-5"/>
-              <a:t>©202</a:t>
-            </a:r>
-            <a:r>
-              <a:rPr lang="en-US" spc="-5"/>
-              <a:t>1</a:t>
-            </a:r>
-            <a:r>
-              <a:rPr spc="-5"/>
-              <a:t> Adobe. All Rights Reserved. Adobe</a:t>
-            </a:r>
-            <a:r>
-              <a:rPr spc="60"/>
-              <a:t> </a:t>
-            </a:r>
-            <a:r>
-              <a:rPr spc="-5"/>
-              <a:t>Confidential.</a:t>
+              <a:rPr lang="it-IT"/>
+              <a:t>©2021 Adobe. All Rights Reserved. Adobe Confidential.</a:t>
             </a:r>
           </a:p>
         </p:txBody>
@@ -2132,7 +2072,7 @@
           <p:nvPr>
             <p:extLst>
               <p:ext uri="{D42A27DB-BD31-4B8C-83A1-F6EECF244321}">
-                <p14:modId xmlns:p14="http://schemas.microsoft.com/office/powerpoint/2010/main" val="2501956132"/>
+                <p14:modId xmlns:p14="http://schemas.microsoft.com/office/powerpoint/2010/main" val="962784674"/>
               </p:ext>
             </p:extLst>
           </p:nvPr>
@@ -2185,19 +2125,15 @@
                         </a:spcBef>
                       </a:pPr>
                       <a:r>
-                        <a:rPr sz="900" spc="0">
+                        <a:rPr lang="it-IT" sz="900">
                           <a:solidFill>
                             <a:srgbClr val="020302"/>
                           </a:solidFill>
                           <a:latin typeface="Adobe Clean"/>
                           <a:cs typeface="Adobe Clean"/>
                         </a:rPr>
-                        <a:t>Priority</a:t>
+                        <a:t>Priorità</a:t>
                       </a:r>
-                      <a:endParaRPr sz="900" spc="0">
-                        <a:latin typeface="Adobe Clean"/>
-                        <a:cs typeface="Adobe Clean"/>
-                      </a:endParaRPr>
                     </a:p>
                   </a:txBody>
                   <a:tcPr marL="0" marR="0" marT="7620" marB="0" anchor="ctr">
@@ -2244,19 +2180,15 @@
                         </a:spcBef>
                       </a:pPr>
                       <a:r>
-                        <a:rPr sz="900" spc="0">
+                        <a:rPr lang="it-IT" sz="900">
                           <a:solidFill>
                             <a:srgbClr val="020302"/>
                           </a:solidFill>
                           <a:latin typeface="Adobe Clean"/>
                           <a:cs typeface="Adobe Clean"/>
                         </a:rPr>
-                        <a:t>Online Support</a:t>
+                        <a:t>Supporto Online</a:t>
                       </a:r>
-                      <a:endParaRPr sz="900" spc="0">
-                        <a:latin typeface="Adobe Clean"/>
-                        <a:cs typeface="Adobe Clean"/>
-                      </a:endParaRPr>
                     </a:p>
                   </a:txBody>
                   <a:tcPr anchor="ctr">
@@ -2303,39 +2235,15 @@
                         </a:spcBef>
                       </a:pPr>
                       <a:r>
-                        <a:rPr sz="900" spc="0">
+                        <a:rPr lang="it-IT" sz="900">
                           <a:solidFill>
                             <a:srgbClr val="FFFFFF"/>
                           </a:solidFill>
                           <a:latin typeface="Adobe Clean"/>
                           <a:cs typeface="Adobe Clean"/>
                         </a:rPr>
-                        <a:t>Business</a:t>
+                        <a:t>Supporto Business</a:t>
                       </a:r>
-                      <a:r>
-                        <a:rPr lang="en-US" sz="900" spc="0">
-                          <a:solidFill>
-                            <a:srgbClr val="FFFFFF"/>
-                          </a:solidFill>
-                          <a:latin typeface="Adobe Clean"/>
-                          <a:cs typeface="Adobe Clean"/>
-                        </a:rPr>
-                        <a:t> </a:t>
-                      </a:r>
-                      <a:r>
-                        <a:rPr sz="900" spc="0">
-                          <a:solidFill>
-                            <a:srgbClr val="FFFFFF"/>
-                          </a:solidFill>
-                          <a:latin typeface="Adobe Clean"/>
-                          <a:cs typeface="Adobe Clean"/>
-                        </a:rPr>
-                        <a:t>Support</a:t>
-                      </a:r>
-                      <a:endParaRPr sz="900" spc="0">
-                        <a:latin typeface="Adobe Clean"/>
-                        <a:cs typeface="Adobe Clean"/>
-                      </a:endParaRPr>
                     </a:p>
                   </a:txBody>
                   <a:tcPr anchor="ctr">
@@ -2389,19 +2297,15 @@
                         </a:spcBef>
                       </a:pPr>
                       <a:r>
-                        <a:rPr sz="900" b="1" spc="0">
+                        <a:rPr lang="it-IT" sz="900" b="1" dirty="0">
                           <a:solidFill>
                             <a:srgbClr val="020302"/>
                           </a:solidFill>
                           <a:latin typeface="Adobe Clean"/>
                           <a:cs typeface="Adobe Clean"/>
                         </a:rPr>
-                        <a:t>PRIORITY 1</a:t>
+                        <a:t>PRIORITÀ 1 (P1)</a:t>
                       </a:r>
-                      <a:endParaRPr sz="900" spc="0">
-                        <a:latin typeface="Adobe Clean"/>
-                        <a:cs typeface="Adobe Clean"/>
-                      </a:endParaRPr>
                     </a:p>
                     <a:p>
                       <a:pPr marL="50800" marR="387985" lvl="0" indent="0" algn="l" defTabSz="914400" rtl="0" eaLnBrk="1" fontAlgn="auto" latinLnBrk="0" hangingPunct="1">
@@ -2422,19 +2326,31 @@
                         <a:defRPr/>
                       </a:pPr>
                       <a:r>
-                        <a:rPr lang="en-US" sz="900" b="0" i="0" spc="0">
+                        <a:rPr lang="it-IT" sz="900" b="0" i="0" dirty="0">
                           <a:solidFill>
                             <a:srgbClr val="000000"/>
                           </a:solidFill>
-                          <a:effectLst/>
                           <a:latin typeface="Adobe Clean Light" panose="020B0303020404020204" pitchFamily="34" charset="0"/>
                         </a:rPr>
-                        <a:t>Customer's production business functions are down or have significant data loss or service degradation and immediate attention is required to restore functionality and usability</a:t>
+                        <a:t>Le funzioni operative nell’ambiente di produzione del cliente non sono disponibili oppure </a:t>
                       </a:r>
-                      <a:endParaRPr lang="en-US" sz="900" b="0" i="0" spc="0">
-                        <a:latin typeface="Adobe Clean Light" panose="020B0303020404020204" pitchFamily="34" charset="0"/>
-                        <a:cs typeface="AdobeClean-Light"/>
-                      </a:endParaRPr>
+                      <a:br>
+                        <a:rPr lang="sk-SK" sz="900" b="0" i="0" dirty="0">
+                          <a:solidFill>
+                            <a:srgbClr val="000000"/>
+                          </a:solidFill>
+                          <a:latin typeface="Adobe Clean Light" panose="020B0303020404020204" pitchFamily="34" charset="0"/>
+                        </a:rPr>
+                      </a:br>
+                      <a:r>
+                        <a:rPr lang="it-IT" sz="900" b="0" i="0" dirty="0">
+                          <a:solidFill>
+                            <a:srgbClr val="000000"/>
+                          </a:solidFill>
+                          <a:latin typeface="Adobe Clean Light" panose="020B0303020404020204" pitchFamily="34" charset="0"/>
+                        </a:rPr>
+                        <a:t>si verificano problemi significativi di perdita di dati o deterioramento del servizio ed è richiesto un intervento immediato per ripristinare funzionalità e usabilità.</a:t>
+                      </a:r>
                     </a:p>
                   </a:txBody>
                   <a:tcPr marL="0" marR="0" marT="3810" marB="0">
@@ -2478,59 +2394,15 @@
                         </a:spcBef>
                       </a:pPr>
                       <a:r>
-                        <a:rPr sz="900" spc="0">
+                        <a:rPr lang="it-IT" sz="900">
                           <a:solidFill>
                             <a:srgbClr val="020302"/>
                           </a:solidFill>
                           <a:latin typeface="AdobeClean-Light"/>
                           <a:cs typeface="AdobeClean-Light"/>
                         </a:rPr>
-                        <a:t>24x7</a:t>
+                        <a:t>24x7 /           1 ora</a:t>
                       </a:r>
-                      <a:r>
-                        <a:rPr lang="en-US" sz="900" spc="0">
-                          <a:solidFill>
-                            <a:srgbClr val="020302"/>
-                          </a:solidFill>
-                          <a:latin typeface="AdobeClean-Light"/>
-                          <a:cs typeface="AdobeClean-Light"/>
-                        </a:rPr>
-                        <a:t> </a:t>
-                      </a:r>
-                      <a:r>
-                        <a:rPr sz="900" spc="0">
-                          <a:solidFill>
-                            <a:srgbClr val="020302"/>
-                          </a:solidFill>
-                          <a:latin typeface="AdobeClean-Light"/>
-                          <a:cs typeface="AdobeClean-Light"/>
-                        </a:rPr>
-                        <a:t>/  </a:t>
-                      </a:r>
-                      <a:r>
-                        <a:rPr lang="en-US" sz="900" spc="0">
-                          <a:solidFill>
-                            <a:srgbClr val="020302"/>
-                          </a:solidFill>
-                          <a:latin typeface="AdobeClean-Light"/>
-                          <a:cs typeface="AdobeClean-Light"/>
-                        </a:rPr>
-                        <a:t>         </a:t>
-                      </a:r>
-                      <a:r>
-                        <a:rPr sz="900" spc="0">
-                          <a:solidFill>
-                            <a:srgbClr val="020302"/>
-                          </a:solidFill>
-                          <a:latin typeface="AdobeClean-Light"/>
-                          <a:cs typeface="AdobeClean-Light"/>
-                        </a:rPr>
-                        <a:t>1 hour</a:t>
-                      </a:r>
-                      <a:endParaRPr sz="900" spc="0">
-                        <a:latin typeface="AdobeClean-Light"/>
-                        <a:cs typeface="AdobeClean-Light"/>
-                      </a:endParaRPr>
                     </a:p>
                   </a:txBody>
                   <a:tcPr anchor="ctr">
@@ -2574,59 +2446,15 @@
                         </a:spcBef>
                       </a:pPr>
                       <a:r>
-                        <a:rPr sz="900" spc="0">
+                        <a:rPr lang="it-IT" sz="900">
                           <a:solidFill>
                             <a:srgbClr val="020302"/>
                           </a:solidFill>
                           <a:latin typeface="AdobeClean-Light"/>
                           <a:cs typeface="AdobeClean-Light"/>
                         </a:rPr>
-                        <a:t>24x7</a:t>
+                        <a:t>24x7 /          1 ora</a:t>
                       </a:r>
-                      <a:r>
-                        <a:rPr lang="en-US" sz="900" spc="0">
-                          <a:solidFill>
-                            <a:srgbClr val="020302"/>
-                          </a:solidFill>
-                          <a:latin typeface="AdobeClean-Light"/>
-                          <a:cs typeface="AdobeClean-Light"/>
-                        </a:rPr>
-                        <a:t> </a:t>
-                      </a:r>
-                      <a:r>
-                        <a:rPr sz="900" spc="0">
-                          <a:solidFill>
-                            <a:srgbClr val="020302"/>
-                          </a:solidFill>
-                          <a:latin typeface="AdobeClean-Light"/>
-                          <a:cs typeface="AdobeClean-Light"/>
-                        </a:rPr>
-                        <a:t>/ </a:t>
-                      </a:r>
-                      <a:r>
-                        <a:rPr lang="en-US" sz="900" spc="0">
-                          <a:solidFill>
-                            <a:srgbClr val="020302"/>
-                          </a:solidFill>
-                          <a:latin typeface="AdobeClean-Light"/>
-                          <a:cs typeface="AdobeClean-Light"/>
-                        </a:rPr>
-                        <a:t>        </a:t>
-                      </a:r>
-                      <a:r>
-                        <a:rPr sz="900" spc="0">
-                          <a:solidFill>
-                            <a:srgbClr val="020302"/>
-                          </a:solidFill>
-                          <a:latin typeface="AdobeClean-Light"/>
-                          <a:cs typeface="AdobeClean-Light"/>
-                        </a:rPr>
-                        <a:t> 1 hour</a:t>
-                      </a:r>
-                      <a:endParaRPr sz="900" spc="0">
-                        <a:latin typeface="AdobeClean-Light"/>
-                        <a:cs typeface="AdobeClean-Light"/>
-                      </a:endParaRPr>
                     </a:p>
                   </a:txBody>
                   <a:tcPr anchor="ctr">
@@ -2682,19 +2510,15 @@
                         </a:spcBef>
                       </a:pPr>
                       <a:r>
-                        <a:rPr sz="900" b="1" spc="0">
+                        <a:rPr lang="it-IT" sz="900" b="1">
                           <a:solidFill>
                             <a:srgbClr val="020302"/>
                           </a:solidFill>
                           <a:latin typeface="Adobe Clean"/>
                           <a:cs typeface="Adobe Clean"/>
                         </a:rPr>
-                        <a:t>PRIORITY 2</a:t>
+                        <a:t>PRIORITÀ 2 (P2)</a:t>
                       </a:r>
-                      <a:endParaRPr sz="900" spc="0">
-                        <a:latin typeface="Adobe Clean"/>
-                        <a:cs typeface="Adobe Clean"/>
-                      </a:endParaRPr>
                     </a:p>
                     <a:p>
                       <a:pPr marL="50165" marR="203200">
@@ -2706,19 +2530,14 @@
                         </a:spcBef>
                       </a:pPr>
                       <a:r>
-                        <a:rPr lang="en-US" sz="900" b="0" i="0" spc="0">
+                        <a:rPr lang="it-IT" sz="900" b="0" i="0">
                           <a:solidFill>
                             <a:srgbClr val="000000"/>
                           </a:solidFill>
-                          <a:effectLst/>
                           <a:latin typeface="Adobe Clean Light" panose="020B0303020404020204" pitchFamily="34" charset="0"/>
                         </a:rPr>
-                        <a:t>Customer's business functions have major service degradation or potential data loss, or a major feature is impacted </a:t>
+                        <a:t>Le funzioni operative del cliente hanno subìto un notevole deterioramento del servizio o potenziale perdita di dati, oppure un problema interessa una funzione importante. </a:t>
                       </a:r>
-                      <a:endParaRPr lang="en-US" sz="900" b="0" i="0" spc="0">
-                        <a:latin typeface="Adobe Clean Light" panose="020B0303020404020204" pitchFamily="34" charset="0"/>
-                        <a:cs typeface="AdobeClean-Light"/>
-                      </a:endParaRPr>
                     </a:p>
                   </a:txBody>
                   <a:tcPr marL="0" marR="0" marT="3810" marB="0">
@@ -2762,79 +2581,15 @@
                         </a:spcBef>
                       </a:pPr>
                       <a:r>
-                        <a:rPr sz="900" spc="0">
+                        <a:rPr lang="it-IT" sz="900">
                           <a:solidFill>
                             <a:srgbClr val="020302"/>
                           </a:solidFill>
                           <a:latin typeface="AdobeClean-Light"/>
                           <a:cs typeface="AdobeClean-Light"/>
                         </a:rPr>
-                        <a:t>Business</a:t>
+                        <a:t>Orario operativo /     4 ore</a:t>
                       </a:r>
-                      <a:r>
-                        <a:rPr lang="en-US" sz="900" spc="0">
-                          <a:solidFill>
-                            <a:srgbClr val="020302"/>
-                          </a:solidFill>
-                          <a:latin typeface="AdobeClean-Light"/>
-                          <a:cs typeface="AdobeClean-Light"/>
-                        </a:rPr>
-                        <a:t> </a:t>
-                      </a:r>
-                      <a:r>
-                        <a:rPr sz="900" spc="0">
-                          <a:solidFill>
-                            <a:srgbClr val="020302"/>
-                          </a:solidFill>
-                          <a:latin typeface="AdobeClean-Light"/>
-                          <a:cs typeface="AdobeClean-Light"/>
-                        </a:rPr>
-                        <a:t>hours</a:t>
-                      </a:r>
-                      <a:r>
-                        <a:rPr lang="en-US" sz="900" spc="0">
-                          <a:solidFill>
-                            <a:srgbClr val="020302"/>
-                          </a:solidFill>
-                          <a:latin typeface="AdobeClean-Light"/>
-                          <a:cs typeface="AdobeClean-Light"/>
-                        </a:rPr>
-                        <a:t> </a:t>
-                      </a:r>
-                      <a:r>
-                        <a:rPr sz="900" spc="0">
-                          <a:solidFill>
-                            <a:srgbClr val="020302"/>
-                          </a:solidFill>
-                          <a:latin typeface="AdobeClean-Light"/>
-                          <a:cs typeface="AdobeClean-Light"/>
-                        </a:rPr>
-                        <a:t>/  </a:t>
-                      </a:r>
-                      <a:r>
-                        <a:rPr lang="en-US" sz="900" spc="0">
-                          <a:solidFill>
-                            <a:srgbClr val="020302"/>
-                          </a:solidFill>
-                          <a:latin typeface="AdobeClean-Light"/>
-                          <a:cs typeface="AdobeClean-Light"/>
-                        </a:rPr>
-                        <a:t>   </a:t>
-                      </a:r>
-                      <a:r>
-                        <a:rPr sz="900" spc="0">
-                          <a:solidFill>
-                            <a:srgbClr val="020302"/>
-                          </a:solidFill>
-                          <a:latin typeface="AdobeClean-Light"/>
-                          <a:cs typeface="AdobeClean-Light"/>
-                        </a:rPr>
-                        <a:t>4 hours</a:t>
-                      </a:r>
-                      <a:endParaRPr sz="900" spc="0">
-                        <a:latin typeface="AdobeClean-Light"/>
-                        <a:cs typeface="AdobeClean-Light"/>
-                      </a:endParaRPr>
                     </a:p>
                   </a:txBody>
                   <a:tcPr anchor="ctr">
@@ -2878,79 +2633,15 @@
                         </a:spcBef>
                       </a:pPr>
                       <a:r>
-                        <a:rPr sz="900" spc="0">
+                        <a:rPr lang="it-IT" sz="900">
                           <a:solidFill>
                             <a:srgbClr val="020302"/>
                           </a:solidFill>
                           <a:latin typeface="AdobeClean-Light"/>
                           <a:cs typeface="AdobeClean-Light"/>
                         </a:rPr>
-                        <a:t>Business</a:t>
+                        <a:t>Orario operativo /      2 ore</a:t>
                       </a:r>
-                      <a:r>
-                        <a:rPr lang="en-US" sz="900" spc="0">
-                          <a:solidFill>
-                            <a:srgbClr val="020302"/>
-                          </a:solidFill>
-                          <a:latin typeface="AdobeClean-Light"/>
-                          <a:cs typeface="AdobeClean-Light"/>
-                        </a:rPr>
-                        <a:t> </a:t>
-                      </a:r>
-                      <a:r>
-                        <a:rPr sz="900" spc="0">
-                          <a:solidFill>
-                            <a:srgbClr val="020302"/>
-                          </a:solidFill>
-                          <a:latin typeface="AdobeClean-Light"/>
-                          <a:cs typeface="AdobeClean-Light"/>
-                        </a:rPr>
-                        <a:t>hours</a:t>
-                      </a:r>
-                      <a:r>
-                        <a:rPr lang="en-US" sz="900" spc="0">
-                          <a:solidFill>
-                            <a:srgbClr val="020302"/>
-                          </a:solidFill>
-                          <a:latin typeface="AdobeClean-Light"/>
-                          <a:cs typeface="AdobeClean-Light"/>
-                        </a:rPr>
-                        <a:t> </a:t>
-                      </a:r>
-                      <a:r>
-                        <a:rPr sz="900" spc="0">
-                          <a:solidFill>
-                            <a:srgbClr val="020302"/>
-                          </a:solidFill>
-                          <a:latin typeface="AdobeClean-Light"/>
-                          <a:cs typeface="AdobeClean-Light"/>
-                        </a:rPr>
-                        <a:t>/  </a:t>
-                      </a:r>
-                      <a:r>
-                        <a:rPr lang="en-US" sz="900" spc="0">
-                          <a:solidFill>
-                            <a:srgbClr val="020302"/>
-                          </a:solidFill>
-                          <a:latin typeface="AdobeClean-Light"/>
-                          <a:cs typeface="AdobeClean-Light"/>
-                        </a:rPr>
-                        <a:t>    </a:t>
-                      </a:r>
-                      <a:r>
-                        <a:rPr sz="900" spc="0">
-                          <a:solidFill>
-                            <a:srgbClr val="020302"/>
-                          </a:solidFill>
-                          <a:latin typeface="AdobeClean-Light"/>
-                          <a:cs typeface="AdobeClean-Light"/>
-                        </a:rPr>
-                        <a:t>2 hours</a:t>
-                      </a:r>
-                      <a:endParaRPr sz="900" spc="0">
-                        <a:latin typeface="AdobeClean-Light"/>
-                        <a:cs typeface="AdobeClean-Light"/>
-                      </a:endParaRPr>
                     </a:p>
                   </a:txBody>
                   <a:tcPr anchor="ctr">
@@ -3006,19 +2697,15 @@
                         </a:spcBef>
                       </a:pPr>
                       <a:r>
-                        <a:rPr sz="900" b="1" spc="0">
+                        <a:rPr lang="it-IT" sz="900" b="1" dirty="0">
                           <a:solidFill>
                             <a:srgbClr val="020302"/>
                           </a:solidFill>
                           <a:latin typeface="Adobe Clean"/>
                           <a:cs typeface="Adobe Clean"/>
                         </a:rPr>
-                        <a:t>PRIORITY 3</a:t>
+                        <a:t>PRIORITÀ 3 (P3)</a:t>
                       </a:r>
-                      <a:endParaRPr sz="900" spc="0">
-                        <a:latin typeface="Adobe Clean"/>
-                        <a:cs typeface="Adobe Clean"/>
-                      </a:endParaRPr>
                     </a:p>
                     <a:p>
                       <a:pPr marL="49530" marR="212090" indent="-2540">
@@ -3030,26 +2717,52 @@
                         </a:spcBef>
                       </a:pPr>
                       <a:r>
-                        <a:rPr kumimoji="0" lang="en-US" sz="900" b="0" i="0" u="none" strike="noStrike" kern="1200" cap="none" spc="0" normalizeH="0" baseline="0" noProof="0">
+                        <a:rPr kumimoji="0" lang="it-IT" sz="900" b="0" i="0" u="none" strike="noStrike" cap="none" normalizeH="0" baseline="0" noProof="0" dirty="0">
                           <a:ln>
                             <a:noFill/>
                           </a:ln>
                           <a:solidFill>
                             <a:srgbClr val="000000"/>
                           </a:solidFill>
-                          <a:effectLst/>
                           <a:uLnTx/>
                           <a:uFillTx/>
                           <a:latin typeface="Adobe Clean Light" panose="020B0303020404020204" pitchFamily="34" charset="0"/>
                           <a:ea typeface="+mn-ea"/>
                           <a:cs typeface="+mn-cs"/>
                         </a:rPr>
-                        <a:t>Customer's business functions have minor service degradation but there exists a solution/workaround allowing business functions to continue </a:t>
+                        <a:t>Le funzioni operative del cliente sono interessate da deterioramento lieve del servizio, </a:t>
                       </a:r>
-                      <a:endParaRPr lang="en-US" sz="900" b="0" i="0" spc="0">
-                        <a:latin typeface="Adobe Clean Light" panose="020B0303020404020204" pitchFamily="34" charset="0"/>
-                        <a:cs typeface="AdobeClean-Light"/>
-                      </a:endParaRPr>
+                      <a:br>
+                        <a:rPr kumimoji="0" lang="sk-SK" sz="900" b="0" i="0" u="none" strike="noStrike" cap="none" normalizeH="0" baseline="0" noProof="0" dirty="0">
+                          <a:ln>
+                            <a:noFill/>
+                          </a:ln>
+                          <a:solidFill>
+                            <a:srgbClr val="000000"/>
+                          </a:solidFill>
+                          <a:uLnTx/>
+                          <a:uFillTx/>
+                          <a:latin typeface="Adobe Clean Light" panose="020B0303020404020204" pitchFamily="34" charset="0"/>
+                          <a:ea typeface="+mn-ea"/>
+                          <a:cs typeface="+mn-cs"/>
+                        </a:rPr>
+                      </a:br>
+                      <a:r>
+                        <a:rPr kumimoji="0" lang="it-IT" sz="900" b="0" i="0" u="none" strike="noStrike" cap="none" normalizeH="0" baseline="0" noProof="0" dirty="0">
+                          <a:ln>
+                            <a:noFill/>
+                          </a:ln>
+                          <a:solidFill>
+                            <a:srgbClr val="000000"/>
+                          </a:solidFill>
+                          <a:uLnTx/>
+                          <a:uFillTx/>
+                          <a:latin typeface="Adobe Clean Light" panose="020B0303020404020204" pitchFamily="34" charset="0"/>
+                          <a:ea typeface="+mn-ea"/>
+                          <a:cs typeface="+mn-cs"/>
+                        </a:rPr>
+                        <a:t>tuttavia è possibile procedere mediante una soluzione temporanea. </a:t>
+                      </a:r>
                     </a:p>
                   </a:txBody>
                   <a:tcPr marL="0" marR="0" marT="3810" marB="0">
@@ -3093,99 +2806,15 @@
                         </a:spcBef>
                       </a:pPr>
                       <a:r>
-                        <a:rPr sz="900" spc="0">
+                        <a:rPr lang="it-IT" sz="900">
                           <a:solidFill>
                             <a:srgbClr val="020302"/>
                           </a:solidFill>
                           <a:latin typeface="AdobeClean-Light"/>
                           <a:cs typeface="AdobeClean-Light"/>
                         </a:rPr>
-                        <a:t>Business</a:t>
+                        <a:t>Orario operativo /     6 ore</a:t>
                       </a:r>
-                      <a:r>
-                        <a:rPr lang="en-US" sz="900" spc="0">
-                          <a:solidFill>
-                            <a:srgbClr val="020302"/>
-                          </a:solidFill>
-                          <a:latin typeface="AdobeClean-Light"/>
-                          <a:cs typeface="AdobeClean-Light"/>
-                        </a:rPr>
-                        <a:t> </a:t>
-                      </a:r>
-                      <a:r>
-                        <a:rPr sz="900" spc="0">
-                          <a:solidFill>
-                            <a:srgbClr val="020302"/>
-                          </a:solidFill>
-                          <a:latin typeface="AdobeClean-Light"/>
-                          <a:cs typeface="AdobeClean-Light"/>
-                        </a:rPr>
-                        <a:t>hours</a:t>
-                      </a:r>
-                      <a:r>
-                        <a:rPr lang="en-US" sz="900" spc="0">
-                          <a:solidFill>
-                            <a:srgbClr val="020302"/>
-                          </a:solidFill>
-                          <a:latin typeface="AdobeClean-Light"/>
-                          <a:cs typeface="AdobeClean-Light"/>
-                        </a:rPr>
-                        <a:t> </a:t>
-                      </a:r>
-                      <a:r>
-                        <a:rPr sz="900" spc="0">
-                          <a:solidFill>
-                            <a:srgbClr val="020302"/>
-                          </a:solidFill>
-                          <a:latin typeface="AdobeClean-Light"/>
-                          <a:cs typeface="AdobeClean-Light"/>
-                        </a:rPr>
-                        <a:t>/  </a:t>
-                      </a:r>
-                      <a:r>
-                        <a:rPr lang="en-US" sz="900" spc="0">
-                          <a:solidFill>
-                            <a:srgbClr val="020302"/>
-                          </a:solidFill>
-                          <a:latin typeface="AdobeClean-Light"/>
-                          <a:cs typeface="AdobeClean-Light"/>
-                        </a:rPr>
-                        <a:t>   </a:t>
-                      </a:r>
-                      <a:r>
-                        <a:rPr sz="900" spc="0">
-                          <a:solidFill>
-                            <a:srgbClr val="020302"/>
-                          </a:solidFill>
-                          <a:latin typeface="AdobeClean-Light"/>
-                          <a:cs typeface="AdobeClean-Light"/>
-                        </a:rPr>
-                        <a:t>6</a:t>
-                      </a:r>
-                      <a:r>
-                        <a:rPr lang="en-US" sz="900" spc="0">
-                          <a:solidFill>
-                            <a:srgbClr val="020302"/>
-                          </a:solidFill>
-                          <a:latin typeface="AdobeClean-Light"/>
-                          <a:cs typeface="AdobeClean-Light"/>
-                        </a:rPr>
-                        <a:t> </a:t>
-                      </a:r>
-                      <a:r>
-                        <a:rPr sz="900" spc="0">
-                          <a:solidFill>
-                            <a:srgbClr val="020302"/>
-                          </a:solidFill>
-                          <a:latin typeface="AdobeClean-Light"/>
-                          <a:cs typeface="AdobeClean-Light"/>
-                        </a:rPr>
-                        <a:t>hours</a:t>
-                      </a:r>
-                      <a:endParaRPr sz="900" spc="0">
-                        <a:latin typeface="AdobeClean-Light"/>
-                        <a:cs typeface="AdobeClean-Light"/>
-                      </a:endParaRPr>
                     </a:p>
                   </a:txBody>
                   <a:tcPr anchor="ctr">
@@ -3229,99 +2858,15 @@
                         </a:spcBef>
                       </a:pPr>
                       <a:r>
-                        <a:rPr sz="900" spc="0">
+                        <a:rPr lang="it-IT" sz="900">
                           <a:solidFill>
                             <a:srgbClr val="020302"/>
                           </a:solidFill>
                           <a:latin typeface="AdobeClean-Light"/>
                           <a:cs typeface="AdobeClean-Light"/>
                         </a:rPr>
-                        <a:t>Business</a:t>
+                        <a:t>Orario operativo /     4 ore</a:t>
                       </a:r>
-                      <a:r>
-                        <a:rPr lang="en-US" sz="900" spc="0">
-                          <a:solidFill>
-                            <a:srgbClr val="020302"/>
-                          </a:solidFill>
-                          <a:latin typeface="AdobeClean-Light"/>
-                          <a:cs typeface="AdobeClean-Light"/>
-                        </a:rPr>
-                        <a:t> </a:t>
-                      </a:r>
-                      <a:r>
-                        <a:rPr sz="900" spc="0">
-                          <a:solidFill>
-                            <a:srgbClr val="020302"/>
-                          </a:solidFill>
-                          <a:latin typeface="AdobeClean-Light"/>
-                          <a:cs typeface="AdobeClean-Light"/>
-                        </a:rPr>
-                        <a:t>hours</a:t>
-                      </a:r>
-                      <a:r>
-                        <a:rPr lang="en-US" sz="900" spc="0">
-                          <a:solidFill>
-                            <a:srgbClr val="020302"/>
-                          </a:solidFill>
-                          <a:latin typeface="AdobeClean-Light"/>
-                          <a:cs typeface="AdobeClean-Light"/>
-                        </a:rPr>
-                        <a:t> </a:t>
-                      </a:r>
-                      <a:r>
-                        <a:rPr sz="900" spc="0">
-                          <a:solidFill>
-                            <a:srgbClr val="020302"/>
-                          </a:solidFill>
-                          <a:latin typeface="AdobeClean-Light"/>
-                          <a:cs typeface="AdobeClean-Light"/>
-                        </a:rPr>
-                        <a:t>/  </a:t>
-                      </a:r>
-                      <a:r>
-                        <a:rPr lang="en-US" sz="900" spc="0">
-                          <a:solidFill>
-                            <a:srgbClr val="020302"/>
-                          </a:solidFill>
-                          <a:latin typeface="AdobeClean-Light"/>
-                          <a:cs typeface="AdobeClean-Light"/>
-                        </a:rPr>
-                        <a:t>   </a:t>
-                      </a:r>
-                      <a:r>
-                        <a:rPr sz="900" spc="0">
-                          <a:solidFill>
-                            <a:srgbClr val="020302"/>
-                          </a:solidFill>
-                          <a:latin typeface="AdobeClean-Light"/>
-                          <a:cs typeface="AdobeClean-Light"/>
-                        </a:rPr>
-                        <a:t>4</a:t>
-                      </a:r>
-                      <a:r>
-                        <a:rPr lang="en-US" sz="900" spc="0">
-                          <a:solidFill>
-                            <a:srgbClr val="020302"/>
-                          </a:solidFill>
-                          <a:latin typeface="AdobeClean-Light"/>
-                          <a:cs typeface="AdobeClean-Light"/>
-                        </a:rPr>
-                        <a:t> </a:t>
-                      </a:r>
-                      <a:r>
-                        <a:rPr sz="900" spc="0">
-                          <a:solidFill>
-                            <a:srgbClr val="020302"/>
-                          </a:solidFill>
-                          <a:latin typeface="AdobeClean-Light"/>
-                          <a:cs typeface="AdobeClean-Light"/>
-                        </a:rPr>
-                        <a:t>hours</a:t>
-                      </a:r>
-                      <a:endParaRPr sz="900" spc="0">
-                        <a:latin typeface="AdobeClean-Light"/>
-                        <a:cs typeface="AdobeClean-Light"/>
-                      </a:endParaRPr>
                     </a:p>
                   </a:txBody>
                   <a:tcPr anchor="ctr">
@@ -3377,19 +2922,15 @@
                         </a:spcBef>
                       </a:pPr>
                       <a:r>
-                        <a:rPr sz="900" b="1" spc="0">
+                        <a:rPr lang="it-IT" sz="900" b="1" dirty="0">
                           <a:solidFill>
                             <a:srgbClr val="020302"/>
                           </a:solidFill>
                           <a:latin typeface="Adobe Clean"/>
                           <a:cs typeface="Adobe Clean"/>
                         </a:rPr>
-                        <a:t>PRIORITY 4</a:t>
+                        <a:t>PRIORITÀ 4 (P4)</a:t>
                       </a:r>
-                      <a:endParaRPr sz="900" spc="0">
-                        <a:latin typeface="Adobe Clean"/>
-                        <a:cs typeface="Adobe Clean"/>
-                      </a:endParaRPr>
                     </a:p>
                     <a:p>
                       <a:pPr marL="48895" marR="0" lvl="0" indent="0" defTabSz="914400" eaLnBrk="1" fontAlgn="auto" latinLnBrk="0" hangingPunct="1">
@@ -3410,19 +2951,14 @@
                         <a:defRPr/>
                       </a:pPr>
                       <a:r>
-                        <a:rPr lang="en-US" sz="900" b="0" i="0" spc="0">
+                        <a:rPr lang="it-IT" sz="900" b="0" i="0" dirty="0">
                           <a:solidFill>
                             <a:srgbClr val="000000"/>
                           </a:solidFill>
-                          <a:effectLst/>
                           <a:latin typeface="Adobe Clean Light" panose="020B0303020404020204" pitchFamily="34" charset="0"/>
                         </a:rPr>
-                        <a:t>General question regarding current product functionality or an enhancement request</a:t>
+                        <a:t>Domande generali sulle attuali funzionalità del prodotto o su una richiesta di miglioramento</a:t>
                       </a:r>
-                      <a:endParaRPr lang="en-US" sz="900" b="0" i="0" spc="0">
-                        <a:latin typeface="Adobe Clean Light" panose="020B0303020404020204" pitchFamily="34" charset="0"/>
-                        <a:cs typeface="AdobeClean-Light"/>
-                      </a:endParaRPr>
                     </a:p>
                   </a:txBody>
                   <a:tcPr marL="0" marR="0" marT="1905" marB="0">
@@ -3466,79 +3002,15 @@
                         </a:spcBef>
                       </a:pPr>
                       <a:r>
-                        <a:rPr sz="900" spc="0">
+                        <a:rPr lang="it-IT" sz="900">
                           <a:solidFill>
                             <a:srgbClr val="020302"/>
                           </a:solidFill>
                           <a:latin typeface="AdobeClean-Light"/>
                           <a:cs typeface="AdobeClean-Light"/>
                         </a:rPr>
-                        <a:t>Business</a:t>
+                        <a:t>Giorni lavorativi /     3 giorni</a:t>
                       </a:r>
-                      <a:r>
-                        <a:rPr lang="en-US" sz="900" spc="0">
-                          <a:solidFill>
-                            <a:srgbClr val="020302"/>
-                          </a:solidFill>
-                          <a:latin typeface="AdobeClean-Light"/>
-                          <a:cs typeface="AdobeClean-Light"/>
-                        </a:rPr>
-                        <a:t> </a:t>
-                      </a:r>
-                      <a:r>
-                        <a:rPr sz="900" spc="0">
-                          <a:solidFill>
-                            <a:srgbClr val="020302"/>
-                          </a:solidFill>
-                          <a:latin typeface="AdobeClean-Light"/>
-                          <a:cs typeface="AdobeClean-Light"/>
-                        </a:rPr>
-                        <a:t>days</a:t>
-                      </a:r>
-                      <a:r>
-                        <a:rPr lang="en-US" sz="900" spc="0">
-                          <a:solidFill>
-                            <a:srgbClr val="020302"/>
-                          </a:solidFill>
-                          <a:latin typeface="AdobeClean-Light"/>
-                          <a:cs typeface="AdobeClean-Light"/>
-                        </a:rPr>
-                        <a:t> </a:t>
-                      </a:r>
-                      <a:r>
-                        <a:rPr sz="900" spc="0">
-                          <a:solidFill>
-                            <a:srgbClr val="020302"/>
-                          </a:solidFill>
-                          <a:latin typeface="AdobeClean-Light"/>
-                          <a:cs typeface="AdobeClean-Light"/>
-                        </a:rPr>
-                        <a:t>/  </a:t>
-                      </a:r>
-                      <a:r>
-                        <a:rPr lang="en-US" sz="900" spc="0">
-                          <a:solidFill>
-                            <a:srgbClr val="020302"/>
-                          </a:solidFill>
-                          <a:latin typeface="AdobeClean-Light"/>
-                          <a:cs typeface="AdobeClean-Light"/>
-                        </a:rPr>
-                        <a:t>    </a:t>
-                      </a:r>
-                      <a:r>
-                        <a:rPr sz="900" spc="0">
-                          <a:solidFill>
-                            <a:srgbClr val="020302"/>
-                          </a:solidFill>
-                          <a:latin typeface="AdobeClean-Light"/>
-                          <a:cs typeface="AdobeClean-Light"/>
-                        </a:rPr>
-                        <a:t>3 days</a:t>
-                      </a:r>
-                      <a:endParaRPr sz="900" spc="0">
-                        <a:latin typeface="AdobeClean-Light"/>
-                        <a:cs typeface="AdobeClean-Light"/>
-                      </a:endParaRPr>
                     </a:p>
                   </a:txBody>
                   <a:tcPr anchor="ctr">
@@ -3582,62 +3054,15 @@
                         </a:spcBef>
                       </a:pPr>
                       <a:r>
-                        <a:rPr sz="900" spc="0">
+                        <a:rPr lang="it-IT" sz="900" dirty="0">
                           <a:solidFill>
                             <a:srgbClr val="020302"/>
                           </a:solidFill>
                           <a:latin typeface="AdobeClean-Light"/>
                           <a:cs typeface="AdobeClean-Light"/>
                         </a:rPr>
-                        <a:t>Business</a:t>
+                        <a:t>Giorni lavorativi / </a:t>
                       </a:r>
-                      <a:r>
-                        <a:rPr lang="en-US" sz="900" spc="0">
-                          <a:solidFill>
-                            <a:srgbClr val="020302"/>
-                          </a:solidFill>
-                          <a:latin typeface="AdobeClean-Light"/>
-                          <a:cs typeface="AdobeClean-Light"/>
-                        </a:rPr>
-                        <a:t> </a:t>
-                      </a:r>
-                      <a:r>
-                        <a:rPr sz="900" spc="0">
-                          <a:solidFill>
-                            <a:srgbClr val="020302"/>
-                          </a:solidFill>
-                          <a:latin typeface="AdobeClean-Light"/>
-                          <a:cs typeface="AdobeClean-Light"/>
-                        </a:rPr>
-                        <a:t>day</a:t>
-                      </a:r>
-                      <a:r>
-                        <a:rPr lang="en-US" sz="900" spc="0">
-                          <a:solidFill>
-                            <a:srgbClr val="020302"/>
-                          </a:solidFill>
-                          <a:latin typeface="AdobeClean-Light"/>
-                          <a:cs typeface="AdobeClean-Light"/>
-                        </a:rPr>
-                        <a:t>s </a:t>
-                      </a:r>
-                      <a:r>
-                        <a:rPr sz="900" spc="0">
-                          <a:solidFill>
-                            <a:srgbClr val="020302"/>
-                          </a:solidFill>
-                          <a:latin typeface="AdobeClean-Light"/>
-                          <a:cs typeface="AdobeClean-Light"/>
-                        </a:rPr>
-                        <a:t>/ </a:t>
-                      </a:r>
-                      <a:endParaRPr lang="en-US" sz="900" spc="0">
-                        <a:solidFill>
-                          <a:srgbClr val="020302"/>
-                        </a:solidFill>
-                        <a:latin typeface="AdobeClean-Light"/>
-                        <a:cs typeface="AdobeClean-Light"/>
-                      </a:endParaRPr>
                     </a:p>
                     <a:p>
                       <a:pPr marL="370840" marR="223520" indent="-202565" algn="ctr">
@@ -3649,39 +3074,15 @@
                         </a:spcBef>
                       </a:pPr>
                       <a:r>
-                        <a:rPr sz="900" spc="0">
+                        <a:rPr lang="it-IT" sz="900" dirty="0">
                           <a:solidFill>
                             <a:srgbClr val="020302"/>
                           </a:solidFill>
                           <a:latin typeface="AdobeClean-Light"/>
                           <a:cs typeface="AdobeClean-Light"/>
                         </a:rPr>
-                        <a:t> </a:t>
+                        <a:t>  1 giorno</a:t>
                       </a:r>
-                      <a:r>
-                        <a:rPr lang="en-US" sz="900" spc="0">
-                          <a:solidFill>
-                            <a:srgbClr val="020302"/>
-                          </a:solidFill>
-                          <a:latin typeface="AdobeClean-Light"/>
-                          <a:cs typeface="AdobeClean-Light"/>
-                        </a:rPr>
-                        <a:t> </a:t>
-                      </a:r>
-                      <a:r>
-                        <a:rPr sz="900" spc="0">
-                          <a:solidFill>
-                            <a:srgbClr val="020302"/>
-                          </a:solidFill>
-                          <a:latin typeface="AdobeClean-Light"/>
-                          <a:cs typeface="AdobeClean-Light"/>
-                        </a:rPr>
-                        <a:t>1 day</a:t>
-                      </a:r>
-                      <a:endParaRPr sz="900" spc="0">
-                        <a:latin typeface="AdobeClean-Light"/>
-                        <a:cs typeface="AdobeClean-Light"/>
-                      </a:endParaRPr>
                     </a:p>
                   </a:txBody>
                   <a:tcPr anchor="ctr">
@@ -3741,14 +3142,14 @@
           <p:nvPr>
             <p:extLst>
               <p:ext uri="{D42A27DB-BD31-4B8C-83A1-F6EECF244321}">
-                <p14:modId xmlns:p14="http://schemas.microsoft.com/office/powerpoint/2010/main" val="116851390"/>
+                <p14:modId xmlns:p14="http://schemas.microsoft.com/office/powerpoint/2010/main" val="495156521"/>
               </p:ext>
             </p:extLst>
           </p:nvPr>
         </p:nvGraphicFramePr>
         <p:xfrm>
           <a:off x="121147" y="2120949"/>
-          <a:ext cx="7498851" cy="4714546"/>
+          <a:ext cx="7498851" cy="4815558"/>
         </p:xfrm>
         <a:graphic>
           <a:graphicData uri="http://schemas.openxmlformats.org/drawingml/2006/table">
@@ -3830,39 +3231,15 @@
                         <a:defRPr/>
                       </a:pPr>
                       <a:r>
-                        <a:rPr lang="en-US" sz="900" spc="-20">
+                        <a:rPr lang="it-IT" sz="900">
                           <a:solidFill>
                             <a:srgbClr val="404040"/>
                           </a:solidFill>
                           <a:latin typeface="Adobe Clean"/>
                           <a:cs typeface="Adobe Clean"/>
                         </a:rPr>
-                        <a:t>Online </a:t>
+                        <a:t>Supporto Online</a:t>
                       </a:r>
-                      <a:r>
-                        <a:rPr lang="en-US" sz="900" spc="-135">
-                          <a:solidFill>
-                            <a:srgbClr val="404040"/>
-                          </a:solidFill>
-                          <a:latin typeface="Adobe Clean"/>
-                          <a:cs typeface="Adobe Clean"/>
-                        </a:rPr>
-                        <a:t> </a:t>
-                      </a:r>
-                      <a:r>
-                        <a:rPr lang="en-US" sz="900" spc="-20">
-                          <a:solidFill>
-                            <a:srgbClr val="404040"/>
-                          </a:solidFill>
-                          <a:latin typeface="Adobe Clean"/>
-                          <a:cs typeface="Adobe Clean"/>
-                        </a:rPr>
-                        <a:t>Support</a:t>
-                      </a:r>
-                      <a:endParaRPr lang="en-US" sz="900">
-                        <a:latin typeface="Adobe Clean"/>
-                        <a:cs typeface="Adobe Clean"/>
-                      </a:endParaRPr>
                     </a:p>
                   </a:txBody>
                   <a:tcPr marL="0" marR="0" marT="7620" marB="0" anchor="ctr">
@@ -3903,39 +3280,15 @@
                         </a:spcBef>
                       </a:pPr>
                       <a:r>
-                        <a:rPr sz="900" spc="-20">
+                        <a:rPr lang="it-IT" sz="900">
                           <a:solidFill>
                             <a:srgbClr val="FFFFFF"/>
                           </a:solidFill>
                           <a:latin typeface="Adobe Clean"/>
                           <a:cs typeface="Adobe Clean"/>
                         </a:rPr>
-                        <a:t>Business</a:t>
+                        <a:t>Supporto Business</a:t>
                       </a:r>
-                      <a:r>
-                        <a:rPr lang="en-US" sz="900" spc="-20">
-                          <a:solidFill>
-                            <a:srgbClr val="FFFFFF"/>
-                          </a:solidFill>
-                          <a:latin typeface="Adobe Clean"/>
-                          <a:cs typeface="Adobe Clean"/>
-                        </a:rPr>
-                        <a:t> </a:t>
-                      </a:r>
-                      <a:r>
-                        <a:rPr sz="900" spc="-20">
-                          <a:solidFill>
-                            <a:srgbClr val="FFFFFF"/>
-                          </a:solidFill>
-                          <a:latin typeface="Adobe Clean"/>
-                          <a:cs typeface="Adobe Clean"/>
-                        </a:rPr>
-                        <a:t>Support</a:t>
-                      </a:r>
-                      <a:endParaRPr sz="900">
-                        <a:latin typeface="Adobe Clean"/>
-                        <a:cs typeface="Adobe Clean"/>
-                      </a:endParaRPr>
                     </a:p>
                   </a:txBody>
                   <a:tcPr marL="0" marR="0" marT="7620" marB="0" anchor="ctr">
@@ -4000,7 +3353,7 @@
                     <a:bodyPr/>
                     <a:lstStyle/>
                     <a:p>
-                      <a:pPr marL="0" marR="0" lvl="0" indent="0" algn="ctr" defTabSz="914400" eaLnBrk="1" fontAlgn="auto" latinLnBrk="0" hangingPunct="1">
+                      <a:pPr marL="0" marR="0" lvl="0" indent="0" algn="l" defTabSz="914400" rtl="0" eaLnBrk="1" fontAlgn="auto" latinLnBrk="0" hangingPunct="1">
                         <a:lnSpc>
                           <a:spcPct val="100000"/>
                         </a:lnSpc>
@@ -4081,13 +3434,13 @@
                         <a:defRPr/>
                       </a:pPr>
                       <a:r>
-                        <a:rPr lang="en-US" sz="800" i="1">
+                        <a:rPr lang="it-IT" sz="800" i="1">
                           <a:solidFill>
                             <a:schemeClr val="bg1"/>
                           </a:solidFill>
                           <a:latin typeface="Adobe Clean Light" panose="020B0303020404020204" pitchFamily="34" charset="0"/>
                         </a:rPr>
-                        <a:t>Paid Support ($)</a:t>
+                        <a:t>Supporto a pagamento ($)</a:t>
                       </a:r>
                     </a:p>
                   </a:txBody>
@@ -4151,22 +3504,15 @@
                         </a:spcBef>
                       </a:pPr>
                       <a:r>
-                        <a:rPr lang="en-US" sz="1000" b="1" i="0" spc="0">
+                        <a:rPr lang="it-IT" sz="1000" b="1" i="0">
                           <a:solidFill>
                             <a:schemeClr val="bg1"/>
                           </a:solidFill>
                           <a:latin typeface="Adobe Clean" panose="020B0503020404020204" pitchFamily="34" charset="0"/>
                           <a:cs typeface="AdobeClean-Light"/>
                         </a:rPr>
-                        <a:t>Assigned Experts</a:t>
+                        <a:t>Esperti assegnati</a:t>
                       </a:r>
-                      <a:endParaRPr sz="1000" b="1" i="0" spc="0">
-                        <a:solidFill>
-                          <a:schemeClr val="bg1"/>
-                        </a:solidFill>
-                        <a:latin typeface="Adobe Clean" panose="020B0503020404020204" pitchFamily="34" charset="0"/>
-                        <a:cs typeface="AdobeClean-Light"/>
-                      </a:endParaRPr>
                     </a:p>
                   </a:txBody>
                   <a:tcPr marL="0" marR="0" marT="58419" marB="0" anchor="ctr">
@@ -4213,7 +3559,7 @@
                         </a:spcBef>
                       </a:pPr>
                       <a:r>
-                        <a:rPr sz="900" spc="0">
+                        <a:rPr lang="it-IT" sz="900">
                           <a:solidFill>
                             <a:srgbClr val="020302"/>
                           </a:solidFill>
@@ -4222,10 +3568,6 @@
                         </a:rPr>
                         <a:t>Account Support Lead</a:t>
                       </a:r>
-                      <a:endParaRPr sz="900" spc="0">
-                        <a:latin typeface="AdobeClean-Light"/>
-                        <a:cs typeface="AdobeClean-Light"/>
-                      </a:endParaRPr>
                     </a:p>
                   </a:txBody>
                   <a:tcPr marL="0" marR="0" marT="58419" marB="0">
@@ -4260,7 +3602,7 @@
                     <a:bodyPr/>
                     <a:lstStyle/>
                     <a:p>
-                      <a:pPr algn="ctr">
+                      <a:pPr algn="l" rtl="0">
                         <a:lnSpc>
                           <a:spcPct val="100000"/>
                         </a:lnSpc>
@@ -4310,7 +3652,7 @@
                         </a:spcBef>
                       </a:pPr>
                       <a:r>
-                        <a:rPr sz="900">
+                        <a:rPr lang="it-IT" sz="900">
                           <a:solidFill>
                             <a:srgbClr val="020302"/>
                           </a:solidFill>
@@ -4319,10 +3661,6 @@
                         </a:rPr>
                         <a:t></a:t>
                       </a:r>
-                      <a:endParaRPr sz="900">
-                        <a:latin typeface="Wingdings"/>
-                        <a:cs typeface="Wingdings"/>
-                      </a:endParaRPr>
                     </a:p>
                   </a:txBody>
                   <a:tcPr marL="0" marR="0" marT="59690" marB="0" anchor="ctr">
@@ -4354,7 +3692,7 @@
                     <a:bodyPr/>
                     <a:lstStyle/>
                     <a:p>
-                      <a:pPr marL="50800">
+                      <a:pPr marL="50800" algn="l" rtl="0">
                         <a:lnSpc>
                           <a:spcPct val="100000"/>
                         </a:lnSpc>
@@ -4400,7 +3738,7 @@
                         </a:spcBef>
                       </a:pPr>
                       <a:r>
-                        <a:rPr sz="900" spc="0">
+                        <a:rPr lang="it-IT" sz="900">
                           <a:solidFill>
                             <a:srgbClr val="020302"/>
                           </a:solidFill>
@@ -4409,10 +3747,6 @@
                         </a:rPr>
                         <a:t>Named Support Engineer</a:t>
                       </a:r>
-                      <a:endParaRPr sz="900" spc="0">
-                        <a:latin typeface="AdobeClean-Light"/>
-                        <a:cs typeface="AdobeClean-Light"/>
-                      </a:endParaRPr>
                     </a:p>
                   </a:txBody>
                   <a:tcPr marL="0" marR="0" marT="58419" marB="0">
@@ -4435,7 +3769,7 @@
                     <a:bodyPr/>
                     <a:lstStyle/>
                     <a:p>
-                      <a:pPr algn="ctr">
+                      <a:pPr algn="l" rtl="0">
                         <a:lnSpc>
                           <a:spcPct val="100000"/>
                         </a:lnSpc>
@@ -4464,7 +3798,7 @@
                     <a:bodyPr/>
                     <a:lstStyle/>
                     <a:p>
-                      <a:pPr algn="ctr">
+                      <a:pPr algn="l" rtl="0">
                         <a:lnSpc>
                           <a:spcPct val="100000"/>
                         </a:lnSpc>
@@ -4495,7 +3829,7 @@
                     <a:bodyPr/>
                     <a:lstStyle/>
                     <a:p>
-                      <a:pPr marL="50800">
+                      <a:pPr marL="50800" algn="l" rtl="0">
                         <a:lnSpc>
                           <a:spcPct val="100000"/>
                         </a:lnSpc>
@@ -4553,7 +3887,7 @@
                         </a:spcBef>
                       </a:pPr>
                       <a:r>
-                        <a:rPr sz="900" spc="0">
+                        <a:rPr lang="it-IT" sz="900">
                           <a:solidFill>
                             <a:srgbClr val="020302"/>
                           </a:solidFill>
@@ -4562,10 +3896,6 @@
                         </a:rPr>
                         <a:t>Technical Account Manager</a:t>
                       </a:r>
-                      <a:endParaRPr sz="900" spc="0">
-                        <a:latin typeface="AdobeClean-Light"/>
-                        <a:cs typeface="AdobeClean-Light"/>
-                      </a:endParaRPr>
                     </a:p>
                   </a:txBody>
                   <a:tcPr marL="0" marR="0" marT="63500" marB="0">
@@ -4594,7 +3924,7 @@
                     <a:bodyPr/>
                     <a:lstStyle/>
                     <a:p>
-                      <a:pPr algn="ctr">
+                      <a:pPr algn="l" rtl="0">
                         <a:lnSpc>
                           <a:spcPct val="100000"/>
                         </a:lnSpc>
@@ -4632,7 +3962,7 @@
                     <a:bodyPr/>
                     <a:lstStyle/>
                     <a:p>
-                      <a:pPr algn="ctr">
+                      <a:pPr algn="l" rtl="0">
                         <a:lnSpc>
                           <a:spcPct val="100000"/>
                         </a:lnSpc>
@@ -4681,22 +4011,15 @@
                         </a:spcBef>
                       </a:pPr>
                       <a:r>
-                        <a:rPr lang="en-US" sz="1000" b="1" i="0" spc="0">
+                        <a:rPr lang="it-IT" sz="1000" b="1" i="0">
                           <a:solidFill>
                             <a:schemeClr val="bg1"/>
                           </a:solidFill>
                           <a:latin typeface="Adobe Clean" panose="020B0503020404020204" pitchFamily="34" charset="0"/>
                           <a:cs typeface="AdobeClean-Light"/>
                         </a:rPr>
-                        <a:t>Support Services</a:t>
+                        <a:t>Servizi di assistenza</a:t>
                       </a:r>
-                      <a:endParaRPr sz="1000" b="1" i="0" spc="0">
-                        <a:solidFill>
-                          <a:schemeClr val="bg1"/>
-                        </a:solidFill>
-                        <a:latin typeface="Adobe Clean" panose="020B0503020404020204" pitchFamily="34" charset="0"/>
-                        <a:cs typeface="AdobeClean-Light"/>
-                      </a:endParaRPr>
                     </a:p>
                   </a:txBody>
                   <a:tcPr marL="0" marR="0" marT="57150" marB="0" anchor="ctr">
@@ -4752,29 +4075,15 @@
                         </a:spcBef>
                       </a:pPr>
                       <a:r>
-                        <a:rPr lang="en-US" sz="900" spc="0">
+                        <a:rPr lang="it-IT" sz="900">
                           <a:solidFill>
                             <a:srgbClr val="020302"/>
                           </a:solidFill>
                           <a:latin typeface="AdobeClean-Light"/>
                           <a:cs typeface="AdobeClean-Light"/>
                         </a:rPr>
-                        <a:t>Online</a:t>
+                        <a:t>Supporto Online</a:t>
                       </a:r>
-                      <a:r>
-                        <a:rPr sz="900" spc="0">
-                          <a:solidFill>
-                            <a:srgbClr val="020302"/>
-                          </a:solidFill>
-                          <a:latin typeface="AdobeClean-Light"/>
-                          <a:cs typeface="AdobeClean-Light"/>
-                        </a:rPr>
-                        <a:t> Support</a:t>
-                      </a:r>
-                      <a:endParaRPr sz="900" spc="0">
-                        <a:latin typeface="AdobeClean-Light"/>
-                        <a:cs typeface="AdobeClean-Light"/>
-                      </a:endParaRPr>
                     </a:p>
                   </a:txBody>
                   <a:tcPr marL="0" marR="0" marT="57150" marB="0">
@@ -4812,39 +4121,15 @@
                         </a:spcBef>
                       </a:pPr>
                       <a:r>
-                        <a:rPr sz="900" spc="-25">
+                        <a:rPr lang="it-IT" sz="900">
                           <a:solidFill>
                             <a:srgbClr val="020302"/>
                           </a:solidFill>
                           <a:latin typeface="AdobeClean-Light"/>
                           <a:cs typeface="AdobeClean-Light"/>
                         </a:rPr>
-                        <a:t>Business</a:t>
+                        <a:t>Orario operativo</a:t>
                       </a:r>
-                      <a:r>
-                        <a:rPr sz="900" spc="-15">
-                          <a:solidFill>
-                            <a:srgbClr val="020302"/>
-                          </a:solidFill>
-                          <a:latin typeface="AdobeClean-Light"/>
-                          <a:cs typeface="AdobeClean-Light"/>
-                        </a:rPr>
-                        <a:t> </a:t>
-                      </a:r>
-                      <a:r>
-                        <a:rPr sz="900" spc="-30">
-                          <a:solidFill>
-                            <a:srgbClr val="020302"/>
-                          </a:solidFill>
-                          <a:latin typeface="AdobeClean-Light"/>
-                          <a:cs typeface="AdobeClean-Light"/>
-                        </a:rPr>
-                        <a:t>hours</a:t>
-                      </a:r>
-                      <a:endParaRPr sz="900">
-                        <a:latin typeface="AdobeClean-Light"/>
-                        <a:cs typeface="AdobeClean-Light"/>
-                      </a:endParaRPr>
                     </a:p>
                   </a:txBody>
                   <a:tcPr marL="0" marR="0" marT="67945" marB="0">
@@ -4883,39 +4168,15 @@
                         </a:spcBef>
                       </a:pPr>
                       <a:r>
-                        <a:rPr sz="900" spc="-25">
+                        <a:rPr lang="it-IT" sz="900">
                           <a:solidFill>
                             <a:srgbClr val="020302"/>
                           </a:solidFill>
                           <a:latin typeface="AdobeClean-Light"/>
                           <a:cs typeface="AdobeClean-Light"/>
                         </a:rPr>
-                        <a:t>Business</a:t>
+                        <a:t>Orario operativo</a:t>
                       </a:r>
-                      <a:r>
-                        <a:rPr sz="900" spc="-15">
-                          <a:solidFill>
-                            <a:srgbClr val="020302"/>
-                          </a:solidFill>
-                          <a:latin typeface="AdobeClean-Light"/>
-                          <a:cs typeface="AdobeClean-Light"/>
-                        </a:rPr>
-                        <a:t> </a:t>
-                      </a:r>
-                      <a:r>
-                        <a:rPr sz="900" spc="-30">
-                          <a:solidFill>
-                            <a:srgbClr val="020302"/>
-                          </a:solidFill>
-                          <a:latin typeface="AdobeClean-Light"/>
-                          <a:cs typeface="AdobeClean-Light"/>
-                        </a:rPr>
-                        <a:t>hours</a:t>
-                      </a:r>
-                      <a:endParaRPr sz="900">
-                        <a:latin typeface="AdobeClean-Light"/>
-                        <a:cs typeface="AdobeClean-Light"/>
-                      </a:endParaRPr>
                     </a:p>
                   </a:txBody>
                   <a:tcPr marL="0" marR="0" marT="67945" marB="0">
@@ -4947,7 +4208,7 @@
                     <a:bodyPr/>
                     <a:lstStyle/>
                     <a:p>
-                      <a:pPr marL="50800">
+                      <a:pPr marL="50800" algn="l" rtl="0">
                         <a:lnSpc>
                           <a:spcPct val="100000"/>
                         </a:lnSpc>
@@ -4996,39 +4257,15 @@
                         </a:spcBef>
                       </a:pPr>
                       <a:r>
-                        <a:rPr sz="900" spc="0">
+                        <a:rPr lang="it-IT" sz="900">
                           <a:solidFill>
                             <a:srgbClr val="020302"/>
                           </a:solidFill>
                           <a:latin typeface="AdobeClean-Light"/>
                           <a:cs typeface="AdobeClean-Light"/>
                         </a:rPr>
-                        <a:t>24x7</a:t>
+                        <a:t>Supporto per problemi P1 24x7x365</a:t>
                       </a:r>
-                      <a:r>
-                        <a:rPr lang="en-US" sz="900" spc="0">
-                          <a:solidFill>
-                            <a:srgbClr val="020302"/>
-                          </a:solidFill>
-                          <a:latin typeface="AdobeClean-Light"/>
-                          <a:cs typeface="AdobeClean-Light"/>
-                        </a:rPr>
-                        <a:t>x365</a:t>
-                      </a:r>
-                      <a:r>
-                        <a:rPr sz="900" spc="0">
-                          <a:solidFill>
-                            <a:srgbClr val="020302"/>
-                          </a:solidFill>
-                          <a:latin typeface="AdobeClean-Light"/>
-                          <a:cs typeface="AdobeClean-Light"/>
-                        </a:rPr>
-                        <a:t> P1 Issue Support</a:t>
-                      </a:r>
-                      <a:endParaRPr sz="900" spc="0">
-                        <a:latin typeface="AdobeClean-Light"/>
-                        <a:cs typeface="AdobeClean-Light"/>
-                      </a:endParaRPr>
                     </a:p>
                   </a:txBody>
                   <a:tcPr marL="0" marR="0" marT="57785" marB="0">
@@ -5060,7 +4297,7 @@
                         </a:spcBef>
                       </a:pPr>
                       <a:r>
-                        <a:rPr sz="900">
+                        <a:rPr lang="it-IT" sz="900">
                           <a:solidFill>
                             <a:srgbClr val="020302"/>
                           </a:solidFill>
@@ -5069,10 +4306,6 @@
                         </a:rPr>
                         <a:t></a:t>
                       </a:r>
-                      <a:endParaRPr sz="900">
-                        <a:latin typeface="Wingdings"/>
-                        <a:cs typeface="Wingdings"/>
-                      </a:endParaRPr>
                     </a:p>
                   </a:txBody>
                   <a:tcPr marL="0" marR="0" marT="58419" marB="0">
@@ -5102,7 +4335,7 @@
                         </a:spcBef>
                       </a:pPr>
                       <a:r>
-                        <a:rPr sz="900">
+                        <a:rPr lang="it-IT" sz="900">
                           <a:solidFill>
                             <a:srgbClr val="020302"/>
                           </a:solidFill>
@@ -5111,10 +4344,6 @@
                         </a:rPr>
                         <a:t></a:t>
                       </a:r>
-                      <a:endParaRPr sz="900">
-                        <a:latin typeface="Wingdings"/>
-                        <a:cs typeface="Wingdings"/>
-                      </a:endParaRPr>
                     </a:p>
                   </a:txBody>
                   <a:tcPr marL="0" marR="0" marT="58419" marB="0">
@@ -5137,7 +4366,7 @@
                     <a:bodyPr/>
                     <a:lstStyle/>
                     <a:p>
-                      <a:pPr marL="50800">
+                      <a:pPr marL="50800" algn="l" rtl="0">
                         <a:lnSpc>
                           <a:spcPct val="100000"/>
                         </a:lnSpc>
@@ -5195,19 +4424,15 @@
                         </a:spcBef>
                       </a:pPr>
                       <a:r>
-                        <a:rPr lang="en-US" sz="900" spc="0">
+                        <a:rPr lang="it-IT" sz="900">
                           <a:solidFill>
                             <a:srgbClr val="020302"/>
                           </a:solidFill>
                           <a:latin typeface="AdobeClean-Light"/>
                           <a:cs typeface="AdobeClean-Light"/>
                         </a:rPr>
-                        <a:t>Named Support Contacts (per product)</a:t>
+                        <a:t>Contatti interni per il supporto (per prodotto)</a:t>
                       </a:r>
-                      <a:endParaRPr sz="900" spc="0">
-                        <a:latin typeface="AdobeClean-Light"/>
-                        <a:cs typeface="AdobeClean-Light"/>
-                      </a:endParaRPr>
                     </a:p>
                   </a:txBody>
                   <a:tcPr marL="0" marR="0" marT="57785" marB="0">
@@ -5245,7 +4470,7 @@
                         </a:spcBef>
                       </a:pPr>
                       <a:r>
-                        <a:rPr sz="900">
+                        <a:rPr lang="it-IT" sz="900">
                           <a:solidFill>
                             <a:srgbClr val="020302"/>
                           </a:solidFill>
@@ -5254,10 +4479,6 @@
                         </a:rPr>
                         <a:t>4</a:t>
                       </a:r>
-                      <a:endParaRPr sz="900">
-                        <a:latin typeface="AdobeClean-Light"/>
-                        <a:cs typeface="AdobeClean-Light"/>
-                      </a:endParaRPr>
                     </a:p>
                   </a:txBody>
                   <a:tcPr marL="0" marR="0" marT="57785" marB="0">
@@ -5287,7 +4508,7 @@
                         </a:spcBef>
                       </a:pPr>
                       <a:r>
-                        <a:rPr sz="900">
+                        <a:rPr lang="it-IT" sz="900">
                           <a:solidFill>
                             <a:srgbClr val="020302"/>
                           </a:solidFill>
@@ -5296,10 +4517,6 @@
                         </a:rPr>
                         <a:t>6</a:t>
                       </a:r>
-                      <a:endParaRPr sz="900">
-                        <a:latin typeface="AdobeClean-Light"/>
-                        <a:cs typeface="AdobeClean-Light"/>
-                      </a:endParaRPr>
                     </a:p>
                   </a:txBody>
                   <a:tcPr marL="0" marR="0" marT="57785" marB="0">
@@ -5322,7 +4539,7 @@
                     <a:bodyPr/>
                     <a:lstStyle/>
                     <a:p>
-                      <a:pPr marL="50800">
+                      <a:pPr marL="50800" algn="l" rtl="0">
                         <a:lnSpc>
                           <a:spcPct val="100000"/>
                         </a:lnSpc>
@@ -5371,19 +4588,15 @@
                         </a:spcBef>
                       </a:pPr>
                       <a:r>
-                        <a:rPr lang="en-US" sz="900" spc="0">
+                        <a:rPr lang="it-IT" sz="900">
                           <a:solidFill>
                             <a:srgbClr val="020302"/>
                           </a:solidFill>
                           <a:latin typeface="AdobeClean-Light"/>
                           <a:cs typeface="AdobeClean-Light"/>
                         </a:rPr>
-                        <a:t>Live Telephone Support</a:t>
+                        <a:t>Supporto telefonico in diretta</a:t>
                       </a:r>
-                      <a:endParaRPr sz="900" spc="0">
-                        <a:latin typeface="AdobeClean-Light"/>
-                        <a:cs typeface="AdobeClean-Light"/>
-                      </a:endParaRPr>
                     </a:p>
                   </a:txBody>
                   <a:tcPr marL="0" marR="0" marT="57785" marB="0">
@@ -5406,7 +4619,7 @@
                     <a:bodyPr/>
                     <a:lstStyle/>
                     <a:p>
-                      <a:pPr algn="ctr">
+                      <a:pPr algn="l" rtl="0">
                         <a:lnSpc>
                           <a:spcPct val="100000"/>
                         </a:lnSpc>
@@ -5447,7 +4660,7 @@
                         </a:spcBef>
                       </a:pPr>
                       <a:r>
-                        <a:rPr sz="900">
+                        <a:rPr lang="it-IT" sz="900">
                           <a:solidFill>
                             <a:srgbClr val="020302"/>
                           </a:solidFill>
@@ -5456,10 +4669,6 @@
                         </a:rPr>
                         <a:t></a:t>
                       </a:r>
-                      <a:endParaRPr sz="900">
-                        <a:latin typeface="Wingdings"/>
-                        <a:cs typeface="Wingdings"/>
-                      </a:endParaRPr>
                     </a:p>
                   </a:txBody>
                   <a:tcPr marL="0" marR="0" marT="59054" marB="0">
@@ -5482,7 +4691,7 @@
                     <a:bodyPr/>
                     <a:lstStyle/>
                     <a:p>
-                      <a:pPr marL="50800">
+                      <a:pPr marL="50800" algn="l" rtl="0">
                         <a:lnSpc>
                           <a:spcPct val="100000"/>
                         </a:lnSpc>
@@ -5531,19 +4740,15 @@
                         </a:spcBef>
                       </a:pPr>
                       <a:r>
-                        <a:rPr sz="900" spc="0">
+                        <a:rPr lang="it-IT" sz="900">
                           <a:solidFill>
                             <a:srgbClr val="020302"/>
                           </a:solidFill>
                           <a:latin typeface="AdobeClean-Light"/>
                           <a:cs typeface="AdobeClean-Light"/>
                         </a:rPr>
-                        <a:t>Escalation Management</a:t>
+                        <a:t>Gestione delle escalation</a:t>
                       </a:r>
-                      <a:endParaRPr sz="900" spc="0">
-                        <a:latin typeface="AdobeClean-Light"/>
-                        <a:cs typeface="AdobeClean-Light"/>
-                      </a:endParaRPr>
                     </a:p>
                   </a:txBody>
                   <a:tcPr marL="0" marR="0" marT="58419" marB="0">
@@ -5566,7 +4771,7 @@
                     <a:bodyPr/>
                     <a:lstStyle/>
                     <a:p>
-                      <a:pPr algn="ctr">
+                      <a:pPr algn="l" rtl="0">
                         <a:lnSpc>
                           <a:spcPct val="100000"/>
                         </a:lnSpc>
@@ -5607,7 +4812,7 @@
                         </a:spcBef>
                       </a:pPr>
                       <a:r>
-                        <a:rPr sz="900">
+                        <a:rPr lang="it-IT" sz="900">
                           <a:solidFill>
                             <a:srgbClr val="020302"/>
                           </a:solidFill>
@@ -5616,10 +4821,6 @@
                         </a:rPr>
                         <a:t></a:t>
                       </a:r>
-                      <a:endParaRPr sz="900">
-                        <a:latin typeface="Wingdings"/>
-                        <a:cs typeface="Wingdings"/>
-                      </a:endParaRPr>
                     </a:p>
                   </a:txBody>
                   <a:tcPr marL="0" marR="0" marT="59690" marB="0">
@@ -5642,7 +4843,7 @@
                     <a:bodyPr/>
                     <a:lstStyle/>
                     <a:p>
-                      <a:pPr marL="50800">
+                      <a:pPr marL="50800" algn="l" rtl="0">
                         <a:lnSpc>
                           <a:spcPct val="100000"/>
                         </a:lnSpc>
@@ -5691,29 +4892,15 @@
                         </a:spcBef>
                       </a:pPr>
                       <a:r>
-                        <a:rPr sz="900" spc="0">
+                        <a:rPr lang="it-IT" sz="900">
                           <a:solidFill>
                             <a:srgbClr val="020302"/>
                           </a:solidFill>
                           <a:latin typeface="AdobeClean-Light"/>
                           <a:cs typeface="AdobeClean-Light"/>
                         </a:rPr>
-                        <a:t>Service Reviews </a:t>
+                        <a:t>Valutazioni dei servizi all’anno</a:t>
                       </a:r>
-                      <a:r>
-                        <a:rPr lang="en-US" sz="900" spc="0">
-                          <a:solidFill>
-                            <a:srgbClr val="020302"/>
-                          </a:solidFill>
-                          <a:latin typeface="AdobeClean-Light"/>
-                          <a:cs typeface="AdobeClean-Light"/>
-                        </a:rPr>
-                        <a:t>per Year</a:t>
-                      </a:r>
-                      <a:endParaRPr sz="900" spc="0">
-                        <a:latin typeface="AdobeClean-Light"/>
-                        <a:cs typeface="AdobeClean-Light"/>
-                      </a:endParaRPr>
                     </a:p>
                   </a:txBody>
                   <a:tcPr marL="0" marR="0" marT="57150" marB="0">
@@ -5736,7 +4923,7 @@
                     <a:bodyPr/>
                     <a:lstStyle/>
                     <a:p>
-                      <a:pPr>
+                      <a:pPr algn="l" rtl="0">
                         <a:lnSpc>
                           <a:spcPct val="100000"/>
                         </a:lnSpc>
@@ -5765,7 +4952,7 @@
                     <a:bodyPr/>
                     <a:lstStyle/>
                     <a:p>
-                      <a:pPr>
+                      <a:pPr algn="l" rtl="0">
                         <a:lnSpc>
                           <a:spcPct val="100000"/>
                         </a:lnSpc>
@@ -5815,16 +5002,12 @@
                         </a:spcBef>
                       </a:pPr>
                       <a:r>
-                        <a:rPr lang="en-US" sz="900" spc="0">
+                        <a:rPr lang="it-IT" sz="900">
                           <a:latin typeface="AdobeClean-Light"/>
                           <a:cs typeface="AdobeClean-Light"/>
                         </a:rPr>
-                        <a:t>Expert Sessions per Year</a:t>
+                        <a:t>Sessioni con esperti all’anno</a:t>
                       </a:r>
-                      <a:endParaRPr sz="900" spc="0">
-                        <a:latin typeface="AdobeClean-Light"/>
-                        <a:cs typeface="AdobeClean-Light"/>
-                      </a:endParaRPr>
                     </a:p>
                   </a:txBody>
                   <a:tcPr marL="0" marR="0" marT="57150" marB="0">
@@ -5853,7 +5036,7 @@
                     <a:bodyPr/>
                     <a:lstStyle/>
                     <a:p>
-                      <a:pPr>
+                      <a:pPr algn="l" rtl="0">
                         <a:lnSpc>
                           <a:spcPct val="100000"/>
                         </a:lnSpc>
@@ -5882,7 +5065,7 @@
                     <a:bodyPr/>
                     <a:lstStyle/>
                     <a:p>
-                      <a:pPr>
+                      <a:pPr algn="l" rtl="0">
                         <a:lnSpc>
                           <a:spcPct val="100000"/>
                         </a:lnSpc>
@@ -5932,16 +5115,12 @@
                         </a:spcBef>
                       </a:pPr>
                       <a:r>
-                        <a:rPr lang="en-US" sz="900" spc="0">
+                        <a:rPr lang="it-IT" sz="900">
                           <a:latin typeface="AdobeClean-Light"/>
                           <a:cs typeface="AdobeClean-Light"/>
                         </a:rPr>
-                        <a:t>Case Reviews</a:t>
+                        <a:t>Valutazione dei casi</a:t>
                       </a:r>
-                      <a:endParaRPr sz="900" spc="0">
-                        <a:latin typeface="AdobeClean-Light"/>
-                        <a:cs typeface="AdobeClean-Light"/>
-                      </a:endParaRPr>
                     </a:p>
                   </a:txBody>
                   <a:tcPr marL="0" marR="0" marT="57150" marB="0">
@@ -5970,7 +5149,7 @@
                     <a:bodyPr/>
                     <a:lstStyle/>
                     <a:p>
-                      <a:pPr>
+                      <a:pPr algn="l" rtl="0">
                         <a:lnSpc>
                           <a:spcPct val="100000"/>
                         </a:lnSpc>
@@ -5999,7 +5178,7 @@
                     <a:bodyPr/>
                     <a:lstStyle/>
                     <a:p>
-                      <a:pPr>
+                      <a:pPr algn="l" rtl="0">
                         <a:lnSpc>
                           <a:spcPct val="100000"/>
                         </a:lnSpc>
@@ -6030,7 +5209,7 @@
                     <a:bodyPr/>
                     <a:lstStyle/>
                     <a:p>
-                      <a:pPr marL="48895">
+                      <a:pPr marL="48895" algn="l" rtl="0">
                         <a:lnSpc>
                           <a:spcPct val="100000"/>
                         </a:lnSpc>
@@ -6088,29 +5267,15 @@
                         </a:spcBef>
                       </a:pPr>
                       <a:r>
-                        <a:rPr sz="900" spc="0">
+                        <a:rPr lang="it-IT" sz="900">
                           <a:solidFill>
                             <a:srgbClr val="020302"/>
                           </a:solidFill>
                           <a:latin typeface="AdobeClean-Light"/>
                           <a:cs typeface="AdobeClean-Light"/>
                         </a:rPr>
-                        <a:t>Event </a:t>
+                        <a:t>Gestione degli eventi</a:t>
                       </a:r>
-                      <a:r>
-                        <a:rPr lang="en-US" sz="900" spc="0">
-                          <a:solidFill>
-                            <a:srgbClr val="020302"/>
-                          </a:solidFill>
-                          <a:latin typeface="AdobeClean-Light"/>
-                          <a:cs typeface="AdobeClean-Light"/>
-                        </a:rPr>
-                        <a:t>Management</a:t>
-                      </a:r>
-                      <a:endParaRPr sz="900" spc="0">
-                        <a:latin typeface="AdobeClean-Light"/>
-                        <a:cs typeface="AdobeClean-Light"/>
-                      </a:endParaRPr>
                     </a:p>
                   </a:txBody>
                   <a:tcPr marL="0" marR="0" marT="58419" marB="0">
@@ -6139,7 +5304,7 @@
                     <a:bodyPr/>
                     <a:lstStyle/>
                     <a:p>
-                      <a:pPr>
+                      <a:pPr algn="l" rtl="0">
                         <a:lnSpc>
                           <a:spcPct val="100000"/>
                         </a:lnSpc>
@@ -6168,7 +5333,7 @@
                     <a:bodyPr/>
                     <a:lstStyle/>
                     <a:p>
-                      <a:pPr>
+                      <a:pPr algn="l" rtl="0">
                         <a:lnSpc>
                           <a:spcPct val="100000"/>
                         </a:lnSpc>
@@ -6199,7 +5364,7 @@
                     <a:bodyPr/>
                     <a:lstStyle/>
                     <a:p>
-                      <a:pPr marL="48895">
+                      <a:pPr marL="48895" algn="l" rtl="0">
                         <a:lnSpc>
                           <a:spcPct val="100000"/>
                         </a:lnSpc>
@@ -6248,39 +5413,15 @@
                         </a:spcBef>
                       </a:pPr>
                       <a:r>
-                        <a:rPr sz="900" spc="0">
+                        <a:rPr lang="it-IT" sz="900">
                           <a:solidFill>
                             <a:srgbClr val="020302"/>
                           </a:solidFill>
                           <a:latin typeface="AdobeClean-Light"/>
                           <a:cs typeface="AdobeClean-Light"/>
                         </a:rPr>
-                        <a:t>Environment</a:t>
+                        <a:t>Valutazione ambiente, manutenzione e monitoraggio</a:t>
                       </a:r>
-                      <a:r>
-                        <a:rPr lang="en-US" sz="900" spc="0">
-                          <a:solidFill>
-                            <a:srgbClr val="020302"/>
-                          </a:solidFill>
-                          <a:latin typeface="AdobeClean-Light"/>
-                          <a:cs typeface="AdobeClean-Light"/>
-                        </a:rPr>
-                        <a:t> </a:t>
-                      </a:r>
-                      <a:r>
-                        <a:rPr sz="900" spc="0">
-                          <a:solidFill>
-                            <a:srgbClr val="020302"/>
-                          </a:solidFill>
-                          <a:latin typeface="AdobeClean-Light"/>
-                          <a:cs typeface="AdobeClean-Light"/>
-                        </a:rPr>
-                        <a:t>Review, Maintenance &amp; Monitoring</a:t>
-                      </a:r>
-                      <a:endParaRPr sz="900" spc="0">
-                        <a:latin typeface="AdobeClean-Light"/>
-                        <a:cs typeface="AdobeClean-Light"/>
-                      </a:endParaRPr>
                     </a:p>
                   </a:txBody>
                   <a:tcPr marL="0" marR="0" marT="59055" marB="0">
@@ -6303,7 +5444,7 @@
                     <a:bodyPr/>
                     <a:lstStyle/>
                     <a:p>
-                      <a:pPr>
+                      <a:pPr algn="l" rtl="0">
                         <a:lnSpc>
                           <a:spcPct val="100000"/>
                         </a:lnSpc>
@@ -6332,7 +5473,7 @@
                     <a:bodyPr/>
                     <a:lstStyle/>
                     <a:p>
-                      <a:pPr>
+                      <a:pPr algn="l" rtl="0">
                         <a:lnSpc>
                           <a:spcPct val="100000"/>
                         </a:lnSpc>
@@ -6363,7 +5504,7 @@
                     <a:bodyPr/>
                     <a:lstStyle/>
                     <a:p>
-                      <a:pPr marL="49530">
+                      <a:pPr marL="49530" algn="l" rtl="0">
                         <a:lnSpc>
                           <a:spcPct val="100000"/>
                         </a:lnSpc>
@@ -6412,19 +5553,34 @@
                         </a:spcBef>
                       </a:pPr>
                       <a:r>
-                        <a:rPr sz="900" spc="0">
+                        <a:rPr lang="it-IT" sz="900" dirty="0">
                           <a:solidFill>
                             <a:srgbClr val="020302"/>
                           </a:solidFill>
                           <a:latin typeface="AdobeClean-Light"/>
                           <a:cs typeface="AdobeClean-Light"/>
                         </a:rPr>
-                        <a:t>Release, Migration, Upgrade &amp; Product Roadmap Review</a:t>
+                        <a:t>Valutazione della roadmap di prodotti, versioni, </a:t>
                       </a:r>
-                      <a:endParaRPr sz="900" spc="0">
-                        <a:latin typeface="AdobeClean-Light"/>
-                        <a:cs typeface="AdobeClean-Light"/>
-                      </a:endParaRPr>
+                      <a:br>
+                        <a:rPr lang="sk-SK" sz="900" dirty="0">
+                          <a:solidFill>
+                            <a:srgbClr val="020302"/>
+                          </a:solidFill>
+                          <a:latin typeface="AdobeClean-Light"/>
+                          <a:cs typeface="AdobeClean-Light"/>
+                        </a:rPr>
+                      </a:br>
+                      <a:r>
+                        <a:rPr lang="it-IT" sz="900" dirty="0">
+                          <a:solidFill>
+                            <a:srgbClr val="020302"/>
+                          </a:solidFill>
+                          <a:latin typeface="AdobeClean-Light"/>
+                          <a:cs typeface="AdobeClean-Light"/>
+                        </a:rPr>
+                        <a:t>migrazione e aggiornamento</a:t>
+                      </a:r>
                     </a:p>
                   </a:txBody>
                   <a:tcPr marL="0" marR="0" marT="63500" marB="0">
@@ -6447,7 +5603,7 @@
                     <a:bodyPr/>
                     <a:lstStyle/>
                     <a:p>
-                      <a:pPr>
+                      <a:pPr algn="l" rtl="0">
                         <a:lnSpc>
                           <a:spcPct val="100000"/>
                         </a:lnSpc>
@@ -6476,7 +5632,7 @@
                     <a:bodyPr/>
                     <a:lstStyle/>
                     <a:p>
-                      <a:pPr>
+                      <a:pPr algn="l" rtl="0">
                         <a:lnSpc>
                           <a:spcPct val="100000"/>
                         </a:lnSpc>
@@ -6507,7 +5663,7 @@
                     <a:bodyPr/>
                     <a:lstStyle/>
                     <a:p>
-                      <a:pPr marL="49530">
+                      <a:pPr marL="49530" algn="l" rtl="0">
                         <a:lnSpc>
                           <a:spcPct val="100000"/>
                         </a:lnSpc>
@@ -6565,11 +5721,11 @@
                         </a:spcBef>
                       </a:pPr>
                       <a:r>
-                        <a:rPr sz="900" spc="0">
+                        <a:rPr lang="it-IT" sz="900">
                           <a:latin typeface="AdobeClean-Light"/>
                           <a:cs typeface="AdobeClean-Light"/>
                         </a:rPr>
-                        <a:t>Cloud Support Activities – Experience Manager as Cloud</a:t>
+                        <a:t>Attività di supporto cloud - Experience Manager as Cloud</a:t>
                       </a:r>
                     </a:p>
                   </a:txBody>
@@ -6599,7 +5755,7 @@
                     <a:bodyPr/>
                     <a:lstStyle/>
                     <a:p>
-                      <a:pPr>
+                      <a:pPr algn="l" rtl="0">
                         <a:lnSpc>
                           <a:spcPct val="100000"/>
                         </a:lnSpc>
@@ -6637,7 +5793,7 @@
                     <a:bodyPr/>
                     <a:lstStyle/>
                     <a:p>
-                      <a:pPr>
+                      <a:pPr algn="l" rtl="0">
                         <a:lnSpc>
                           <a:spcPct val="100000"/>
                         </a:lnSpc>
@@ -6686,22 +5842,15 @@
                         </a:spcBef>
                       </a:pPr>
                       <a:r>
-                        <a:rPr lang="en-US" sz="1000" b="1" i="0" spc="0">
+                        <a:rPr lang="it-IT" sz="1000" b="1" i="0">
                           <a:solidFill>
                             <a:schemeClr val="bg1"/>
                           </a:solidFill>
                           <a:latin typeface="Adobe Clean" panose="020B0503020404020204" pitchFamily="34" charset="0"/>
                           <a:cs typeface="AdobeClean-Light"/>
                         </a:rPr>
-                        <a:t>Field Services</a:t>
+                        <a:t>Servizi sul campo</a:t>
                       </a:r>
-                      <a:endParaRPr sz="1000" b="1" i="0" spc="0">
-                        <a:solidFill>
-                          <a:schemeClr val="bg1"/>
-                        </a:solidFill>
-                        <a:latin typeface="Adobe Clean" panose="020B0503020404020204" pitchFamily="34" charset="0"/>
-                        <a:cs typeface="AdobeClean-Light"/>
-                      </a:endParaRPr>
                     </a:p>
                   </a:txBody>
                   <a:tcPr marL="0" marR="0" marT="48260" marB="0" anchor="ctr">
@@ -6754,19 +5903,15 @@
                         </a:spcBef>
                       </a:pPr>
                       <a:r>
-                        <a:rPr sz="900" spc="0">
+                        <a:rPr lang="it-IT" sz="900">
                           <a:solidFill>
                             <a:srgbClr val="020302"/>
                           </a:solidFill>
                           <a:latin typeface="AdobeClean-Light"/>
                           <a:cs typeface="AdobeClean-Light"/>
                         </a:rPr>
-                        <a:t>Launch Advisory Services – First Year of new solution</a:t>
+                        <a:t>Launch Advisory - Nel primo anno di nuove soluzioni</a:t>
                       </a:r>
-                      <a:endParaRPr sz="900" spc="0">
-                        <a:latin typeface="AdobeClean-Light"/>
-                        <a:cs typeface="AdobeClean-Light"/>
-                      </a:endParaRPr>
                     </a:p>
                     <a:p>
                       <a:pPr marL="48260" hangingPunct="0">
@@ -6778,11 +5923,11 @@
                         </a:spcBef>
                       </a:pPr>
                       <a:r>
-                        <a:rPr sz="900" spc="0">
+                        <a:rPr lang="it-IT" sz="900">
                           <a:latin typeface="AdobeClean-Light"/>
                           <a:cs typeface="AdobeClean-Light"/>
                         </a:rPr>
-                        <a:t>Field Service Activities </a:t>
+                        <a:t>Attività di servizio sul campo </a:t>
                       </a:r>
                     </a:p>
                   </a:txBody>
@@ -6818,7 +5963,7 @@
                     <a:bodyPr/>
                     <a:lstStyle/>
                     <a:p>
-                      <a:pPr>
+                      <a:pPr algn="l" rtl="0">
                         <a:lnSpc>
                           <a:spcPct val="100000"/>
                         </a:lnSpc>
@@ -6856,7 +6001,7 @@
                     <a:bodyPr/>
                     <a:lstStyle/>
                     <a:p>
-                      <a:pPr>
+                      <a:pPr algn="l" rtl="0">
                         <a:lnSpc>
                           <a:spcPct val="100000"/>
                         </a:lnSpc>
@@ -6941,7 +6086,7 @@
                     <a:bodyPr/>
                     <a:lstStyle/>
                     <a:p>
-                      <a:pPr>
+                      <a:pPr algn="l" rtl="0">
                         <a:lnSpc>
                           <a:spcPct val="100000"/>
                         </a:lnSpc>
@@ -6967,12 +6112,12 @@
                     <a:bodyPr/>
                     <a:lstStyle/>
                     <a:p>
-                      <a:pPr>
+                      <a:pPr algn="l" rtl="0">
                         <a:lnSpc>
                           <a:spcPct val="100000"/>
                         </a:lnSpc>
                       </a:pPr>
-                      <a:endParaRPr sz="900">
+                      <a:endParaRPr sz="900" dirty="0">
                         <a:latin typeface="Times New Roman"/>
                         <a:cs typeface="Times New Roman"/>
                       </a:endParaRPr>
@@ -7031,7 +6176,7 @@
           <a:lstStyle/>
           <a:p>
             <a:r>
-              <a:rPr lang="en-US" sz="700" i="1">
+              <a:rPr lang="it-IT" sz="700" i="1">
                 <a:solidFill>
                   <a:schemeClr val="bg1"/>
                 </a:solidFill>
@@ -7234,18 +6379,14 @@
               </a:spcBef>
             </a:pPr>
             <a:r>
-              <a:rPr lang="en-US" sz="1000">
+              <a:rPr lang="it-IT" sz="1000">
                 <a:solidFill>
                   <a:srgbClr val="000000"/>
                 </a:solidFill>
                 <a:latin typeface="Adobe Clean Light" panose="020B0303020404020204" pitchFamily="34" charset="0"/>
               </a:rPr>
-              <a:t>A designated Account Support Lead to proactively monitor cases, drive cross-team collaboration, deliver onboarding webinars, run service reports, provide non-technical support assistance, and function as your escalation point and internal advocate within Adobe Support.</a:t>
+              <a:t>Un Account Support Lead dedicato per il monitoraggio proattivo dei casi e per promuovere la collaborazione tra team, fornire webinar introduttivi, eseguire rapporti sui servizi e fornire assistenza non tecnica. Inoltre funge da riferimento per l’escalation dei problemi e da rappresentante del cliente all’interno del supporto Adobe.</a:t>
             </a:r>
-            <a:endParaRPr lang="en-US" sz="1000">
-              <a:latin typeface="Adobe Clean Light" panose="020B0303020404020204" pitchFamily="34" charset="0"/>
-              <a:cs typeface="AdobeClean-Light"/>
-            </a:endParaRPr>
           </a:p>
         </p:txBody>
       </p:sp>
@@ -7282,42 +6423,15 @@
               </a:tabLst>
             </a:pPr>
             <a:r>
-              <a:rPr sz="1000">
+              <a:rPr lang="it-IT" sz="1000">
                 <a:solidFill>
                   <a:srgbClr val="020302"/>
                 </a:solidFill>
                 <a:latin typeface="AdobeClean-Light"/>
                 <a:cs typeface="AdobeClean-Light"/>
               </a:rPr>
-              <a:t>Start a chat session to get answers</a:t>
+              <a:t>Avvia una sessione di chat per ottenere risposte e assistenza nell’invio di un caso.</a:t>
             </a:r>
-            <a:r>
-              <a:rPr lang="en-US" sz="1000">
-                <a:solidFill>
-                  <a:srgbClr val="020302"/>
-                </a:solidFill>
-                <a:latin typeface="AdobeClean-Light"/>
-                <a:cs typeface="AdobeClean-Light"/>
-              </a:rPr>
-              <a:t> &amp; </a:t>
-            </a:r>
-            <a:r>
-              <a:rPr sz="1000">
-                <a:solidFill>
-                  <a:srgbClr val="020302"/>
-                </a:solidFill>
-                <a:latin typeface="AdobeClean-Light"/>
-                <a:cs typeface="AdobeClean-Light"/>
-              </a:rPr>
-              <a:t>help with case submission</a:t>
-            </a:r>
-            <a:endParaRPr lang="en-US" sz="1000">
-              <a:solidFill>
-                <a:srgbClr val="020302"/>
-              </a:solidFill>
-              <a:latin typeface="AdobeClean-Light"/>
-              <a:cs typeface="AdobeClean-Light"/>
-            </a:endParaRPr>
           </a:p>
           <a:p>
             <a:pPr marL="33020" marR="159385">
@@ -7332,17 +6446,17 @@
               </a:tabLst>
             </a:pPr>
             <a:r>
-              <a:rPr sz="1000" i="1">
+              <a:rPr lang="it-IT" sz="1000" i="1">
                 <a:solidFill>
                   <a:srgbClr val="7A7A7A"/>
                 </a:solidFill>
                 <a:latin typeface="AdobeClean-LightIt"/>
                 <a:cs typeface="AdobeClean-LightIt"/>
               </a:rPr>
-              <a:t>*Not all products have live chat support</a:t>
+              <a:t>* Il supporto chat in diretta non è disponibile per tutti i prodotti</a:t>
             </a:r>
             <a:r>
-              <a:rPr sz="900" i="1">
+              <a:rPr lang="it-IT" sz="900" i="1">
                 <a:solidFill>
                   <a:srgbClr val="7A7A7A"/>
                 </a:solidFill>
@@ -7351,10 +6465,6 @@
               </a:rPr>
               <a:t>.  </a:t>
             </a:r>
-            <a:endParaRPr sz="900">
-              <a:latin typeface="AdobeClean-Light"/>
-              <a:cs typeface="AdobeClean-Light"/>
-            </a:endParaRPr>
           </a:p>
         </p:txBody>
       </p:sp>
@@ -7430,12 +6540,12 @@
               <a:defRPr/>
             </a:pPr>
             <a:r>
-              <a:rPr lang="en-US" sz="1200">
+              <a:rPr lang="it-IT" sz="1200">
                 <a:solidFill>
                   <a:srgbClr val="000000"/>
                 </a:solidFill>
               </a:rPr>
-              <a:t>Community Forums</a:t>
+              <a:t>Forum della community</a:t>
             </a:r>
           </a:p>
         </p:txBody>
@@ -7478,12 +6588,12 @@
               </a:spcAft>
             </a:pPr>
             <a:r>
-              <a:rPr lang="en-US" sz="1200" b="1">
+              <a:rPr lang="it-IT" sz="1200" b="1">
                 <a:latin typeface="+mj-lt"/>
                 <a:ea typeface="Open Sans" pitchFamily="34" charset="0"/>
                 <a:cs typeface="Open Sans" pitchFamily="34" charset="0"/>
               </a:rPr>
-              <a:t>Online Forums</a:t>
+              <a:t>Forum online</a:t>
             </a:r>
           </a:p>
         </p:txBody>
@@ -7516,13 +6626,13 @@
           <a:lstStyle/>
           <a:p>
             <a:r>
-              <a:rPr lang="en-US" sz="1000">
+              <a:rPr lang="it-IT" sz="1000">
                 <a:solidFill>
                   <a:srgbClr val="000000"/>
                 </a:solidFill>
                 <a:latin typeface="Adobe Clean Light" panose="020B0303020404020204" pitchFamily="34" charset="0"/>
               </a:rPr>
-              <a:t>Continuous online access to a growing database of technical solutions, product documentation, FAQs and more. Thousands of customers can connect to share best practices and lessons learned.</a:t>
+              <a:t>Accesso online continuo a un database in continua crescita di soluzioni tecniche, documentazione del prodotto, risposte alle domande più frequenti e altro ancora. Migliaia di clienti possono condividere best practice ed esperienze.</a:t>
             </a:r>
           </a:p>
         </p:txBody>
@@ -7565,12 +6675,12 @@
               </a:spcAft>
             </a:pPr>
             <a:r>
-              <a:rPr lang="en-US" sz="1200" b="1">
+              <a:rPr lang="it-IT" sz="1200" b="1">
                 <a:latin typeface="+mj-lt"/>
                 <a:ea typeface="Open Sans" pitchFamily="34" charset="0"/>
                 <a:cs typeface="Open Sans" pitchFamily="34" charset="0"/>
               </a:rPr>
-              <a:t>Self-guided Journeys</a:t>
+              <a:t>Percorsi autoguidati</a:t>
             </a:r>
           </a:p>
         </p:txBody>
@@ -7590,7 +6700,7 @@
         <p:spPr>
           <a:xfrm>
             <a:off x="5376301" y="6529249"/>
-            <a:ext cx="2286000" cy="959237"/>
+            <a:ext cx="2286000" cy="1143903"/>
           </a:xfrm>
           <a:prstGeom prst="rect">
             <a:avLst/>
@@ -7603,13 +6713,13 @@
           <a:lstStyle/>
           <a:p>
             <a:r>
-              <a:rPr lang="en-US" sz="1000">
+              <a:rPr lang="it-IT" sz="900" dirty="0">
                 <a:solidFill>
                   <a:srgbClr val="000000"/>
                 </a:solidFill>
                 <a:latin typeface="Adobe Clean Light" panose="020B0303020404020204" pitchFamily="34" charset="0"/>
               </a:rPr>
-              <a:t>Experience Makers are made with Experience League. Customers can kickstart their Customer Experience Management abilities with personalized learning to develop skills, engage with a global community of peers, and earn career advancing recognition.</a:t>
+              <a:t>Diventa un Experience Maker con Experience League. Puoi acquisire rapidamente le capacità necessarie nella gestione della customer experience seguendo un percorso di apprendimento personalizzato per sviluppare nuove competenze, partecipare a una comunità globale di professionisti e guadagnare riconoscimenti di valore sul piano professionale.</a:t>
             </a:r>
           </a:p>
         </p:txBody>
@@ -7657,12 +6767,12 @@
               <a:defRPr/>
             </a:pPr>
             <a:r>
-              <a:rPr lang="en-US" sz="1200">
+              <a:rPr lang="it-IT" sz="1200">
                 <a:solidFill>
                   <a:srgbClr val="000000"/>
                 </a:solidFill>
               </a:rPr>
-              <a:t>Live Chat  Support*</a:t>
+              <a:t>Supporto chat in diretta*</a:t>
             </a:r>
           </a:p>
         </p:txBody>
@@ -7705,12 +6815,12 @@
               </a:spcAft>
             </a:pPr>
             <a:r>
-              <a:rPr lang="en-US" sz="1200" b="1">
+              <a:rPr lang="it-IT" sz="1200" b="1">
                 <a:latin typeface="+mj-lt"/>
                 <a:ea typeface="Open Sans" pitchFamily="34" charset="0"/>
                 <a:cs typeface="Open Sans" pitchFamily="34" charset="0"/>
               </a:rPr>
-              <a:t>Chat Support</a:t>
+              <a:t>Supporto chat</a:t>
             </a:r>
           </a:p>
         </p:txBody>
@@ -7758,12 +6868,12 @@
               <a:defRPr/>
             </a:pPr>
             <a:r>
-              <a:rPr lang="en-US" sz="1200">
+              <a:rPr lang="it-IT" sz="1200">
                 <a:solidFill>
                   <a:srgbClr val="000000"/>
                 </a:solidFill>
               </a:rPr>
-              <a:t>24X7 P1 </a:t>
+              <a:t>24x7 P1 </a:t>
             </a:r>
           </a:p>
         </p:txBody>
@@ -7806,12 +6916,12 @@
               </a:spcAft>
             </a:pPr>
             <a:r>
-              <a:rPr lang="en-US" sz="1200" b="1">
+              <a:rPr lang="it-IT" sz="1200" b="1">
                 <a:latin typeface="+mj-lt"/>
                 <a:ea typeface="Open Sans" pitchFamily="34" charset="0"/>
                 <a:cs typeface="Open Sans" pitchFamily="34" charset="0"/>
               </a:rPr>
-              <a:t>Phone Support</a:t>
+              <a:t>Supporto telefonico</a:t>
             </a:r>
           </a:p>
         </p:txBody>
@@ -7844,26 +6954,20 @@
           <a:lstStyle/>
           <a:p>
             <a:r>
-              <a:rPr lang="en-US" sz="1000">
+              <a:rPr lang="it-IT" sz="1000">
                 <a:solidFill>
                   <a:srgbClr val="020302"/>
                 </a:solidFill>
                 <a:latin typeface="AdobeClean-Light"/>
               </a:rPr>
-              <a:t>Authorized users or Named Support Contacts </a:t>
+              <a:t>Gli utenti autorizzati o i contatti interni per il supporto possono segnalare i problemi tramite tutti i canali disponibili (compreso il supporto telefonico per casi P1) e interagire con il team Adobe di assistenza tecnica per conto della tua azienda</a:t>
             </a:r>
             <a:r>
-              <a:rPr lang="en-US" sz="1000">
+              <a:rPr lang="it-IT" sz="1000">
                 <a:latin typeface="Adobe Clean Light" panose="020B0303020404020204" pitchFamily="34" charset="0"/>
               </a:rPr>
-              <a:t>can submit issues through all available  channels (including phone for P1) and interact with our technical support team on behalf of your company. </a:t>
+              <a:t>. </a:t>
             </a:r>
-            <a:endParaRPr lang="en-US" sz="1000">
-              <a:solidFill>
-                <a:srgbClr val="000000"/>
-              </a:solidFill>
-              <a:latin typeface="Adobe Clean Light" panose="020B0303020404020204" pitchFamily="34" charset="0"/>
-            </a:endParaRPr>
           </a:p>
         </p:txBody>
       </p:sp>
@@ -7907,24 +7011,8 @@
               </a:spcBef>
             </a:pPr>
             <a:r>
-              <a:rPr spc="-5"/>
-              <a:t>©202</a:t>
-            </a:r>
-            <a:r>
-              <a:rPr lang="en-US" spc="-5"/>
-              <a:t>1</a:t>
-            </a:r>
-            <a:r>
-              <a:rPr spc="-5"/>
-              <a:t> Adobe. All Rights Reserved. Adobe</a:t>
-            </a:r>
-            <a:r>
-              <a:rPr spc="60"/>
-              <a:t> </a:t>
-            </a:r>
-            <a:r>
-              <a:rPr spc="-5"/>
-              <a:t>Confidential.</a:t>
+              <a:rPr lang="it-IT"/>
+              <a:t>©2021 Adobe. All Rights Reserved. Adobe Confidential.</a:t>
             </a:r>
           </a:p>
         </p:txBody>
@@ -7967,7 +7055,7 @@
               </a:spcAft>
             </a:pPr>
             <a:r>
-              <a:rPr lang="en-US" sz="1200" b="1" spc="-10">
+              <a:rPr lang="it-IT" sz="1200" b="1">
                 <a:solidFill>
                   <a:srgbClr val="020302"/>
                 </a:solidFill>
@@ -7993,7 +7081,7 @@
         <p:spPr>
           <a:xfrm>
             <a:off x="401995" y="5785009"/>
-            <a:ext cx="1848207" cy="45719"/>
+            <a:ext cx="2600697" cy="52862"/>
           </a:xfrm>
           <a:custGeom>
             <a:avLst/>
@@ -8062,19 +7150,15 @@
               </a:spcBef>
             </a:pPr>
             <a:r>
-              <a:rPr lang="en-US" sz="1400" b="1" spc="-10">
+              <a:rPr lang="it-IT" sz="1400" b="1">
                 <a:solidFill>
                   <a:srgbClr val="020302"/>
                 </a:solidFill>
                 <a:latin typeface="Adobe Clean"/>
                 <a:cs typeface="Adobe Clean"/>
               </a:rPr>
-              <a:t>Online Support Features</a:t>
+              <a:t>Caratteristiche del supporto online</a:t>
             </a:r>
-            <a:endParaRPr lang="en-US" sz="1400">
-              <a:latin typeface="Adobe Clean"/>
-              <a:cs typeface="Adobe Clean"/>
-            </a:endParaRPr>
           </a:p>
         </p:txBody>
       </p:sp>
@@ -8092,8 +7176,8 @@
         </p:nvSpPr>
         <p:spPr>
           <a:xfrm>
-            <a:off x="384421" y="774495"/>
-            <a:ext cx="2011680" cy="0"/>
+            <a:off x="384420" y="774494"/>
+            <a:ext cx="2717125" cy="45719"/>
           </a:xfrm>
           <a:custGeom>
             <a:avLst/>
@@ -8162,19 +7246,15 @@
               </a:spcBef>
             </a:pPr>
             <a:r>
-              <a:rPr lang="en-US" sz="1400" b="1" spc="-10">
+              <a:rPr lang="it-IT" sz="1400" b="1">
                 <a:solidFill>
                   <a:srgbClr val="020302"/>
                 </a:solidFill>
                 <a:latin typeface="Adobe Clean"/>
                 <a:cs typeface="Adobe Clean"/>
               </a:rPr>
-              <a:t>Business  Support Features</a:t>
+              <a:t>Caratteristiche del supporto Business</a:t>
             </a:r>
-            <a:endParaRPr lang="en-US" sz="1400">
-              <a:latin typeface="Adobe Clean"/>
-              <a:cs typeface="Adobe Clean"/>
-            </a:endParaRPr>
           </a:p>
         </p:txBody>
       </p:sp>
@@ -8214,15 +7294,11 @@
               </a:spcBef>
             </a:pPr>
             <a:r>
-              <a:rPr lang="en-US" sz="1000">
+              <a:rPr lang="it-IT" sz="1000">
                 <a:latin typeface="Adobe Clean Light" panose="020B0303020404020204" pitchFamily="34" charset="0"/>
               </a:rPr>
-              <a:t>Customers can submit support cases via Phone for all P2, P3, P4 issues during regional support hours. There are no upper limits on the number of times you can call into support. Customers can also request a call back from support or request a meeting to demonstrate or work through an issue using a shared remote desktop session.</a:t>
+              <a:t>I clienti possono segnalare telefonicamente i problemi P2, P3 e P4 durante l’orario operativo per la propria area geografica. Non vi è alcun limite al numero di chiamate di supporto consentite. I clienti possono anche chiedere di essere richiamati dal supporto, o richiedere una sessione con desktop remoto condiviso a scopo di dimostrazione o risoluzione di un problema.</a:t>
             </a:r>
-            <a:endParaRPr lang="en-US" sz="1000">
-              <a:latin typeface="Adobe Clean Light" panose="020B0303020404020204" pitchFamily="34" charset="0"/>
-              <a:cs typeface="AdobeClean-Light"/>
-            </a:endParaRPr>
           </a:p>
         </p:txBody>
       </p:sp>
@@ -8264,13 +7340,13 @@
               </a:spcAft>
             </a:pPr>
             <a:r>
-              <a:rPr lang="en-US" sz="1200" b="1" spc="-10">
+              <a:rPr lang="it-IT" sz="1200" b="1">
                 <a:solidFill>
                   <a:srgbClr val="020302"/>
                 </a:solidFill>
                 <a:latin typeface="+mj-lt"/>
               </a:rPr>
-              <a:t>Live Telephone Support</a:t>
+              <a:t>Supporto telefonico in diretta</a:t>
             </a:r>
           </a:p>
         </p:txBody>
@@ -8311,18 +7387,14 @@
               </a:spcBef>
             </a:pPr>
             <a:r>
-              <a:rPr lang="en-US" sz="1000">
+              <a:rPr lang="it-IT" sz="1000">
                 <a:solidFill>
                   <a:srgbClr val="4B4B4B"/>
                 </a:solidFill>
                 <a:latin typeface="Adobe Clean Light" panose="020B0303020404020204" pitchFamily="34" charset="0"/>
               </a:rPr>
-              <a:t>A designated point of contact within Adobe who can provide escalation assistance, regular updates and ensure priority is given to your most critical open support requests.</a:t>
+              <a:t>Un contatto Adobe dedicato che può fornire assistenza e aggiornamenti regolari in merito ai casi che richiedono escalation, e assicurarsi che venga data priorità alle richieste di supporto aperte più critiche.</a:t>
             </a:r>
-            <a:endParaRPr lang="en-US" sz="1000">
-              <a:latin typeface="Adobe Clean Light" panose="020B0303020404020204" pitchFamily="34" charset="0"/>
-              <a:cs typeface="AdobeClean-Light"/>
-            </a:endParaRPr>
           </a:p>
         </p:txBody>
       </p:sp>
@@ -8364,13 +7436,13 @@
               </a:spcAft>
             </a:pPr>
             <a:r>
-              <a:rPr lang="en-US" sz="1200" b="1" spc="-10">
+              <a:rPr lang="it-IT" sz="1200" b="1">
                 <a:solidFill>
                   <a:srgbClr val="020302"/>
                 </a:solidFill>
                 <a:latin typeface="+mj-lt"/>
               </a:rPr>
-              <a:t>Escalation Management</a:t>
+              <a:t>Gestione delle escalation</a:t>
             </a:r>
           </a:p>
         </p:txBody>
@@ -8418,7 +7490,7 @@
               <a:defRPr/>
             </a:pPr>
             <a:r>
-              <a:rPr lang="en-US" sz="1200">
+              <a:rPr lang="it-IT" sz="1200">
                 <a:solidFill>
                   <a:srgbClr val="000000"/>
                 </a:solidFill>
@@ -8466,12 +7538,12 @@
               </a:spcAft>
             </a:pPr>
             <a:r>
-              <a:rPr lang="en-US" sz="1200" b="1">
+              <a:rPr lang="it-IT" sz="1200" b="1">
                 <a:latin typeface="+mj-lt"/>
                 <a:ea typeface="Open Sans" pitchFamily="34" charset="0"/>
                 <a:cs typeface="Open Sans" pitchFamily="34" charset="0"/>
               </a:rPr>
-              <a:t>Webinars</a:t>
+              <a:t>Webinar</a:t>
             </a:r>
           </a:p>
         </p:txBody>
@@ -8491,7 +7563,7 @@
         <p:spPr>
           <a:xfrm>
             <a:off x="370040" y="8618616"/>
-            <a:ext cx="2286000" cy="1113125"/>
+            <a:ext cx="2286000" cy="959237"/>
           </a:xfrm>
           <a:prstGeom prst="rect">
             <a:avLst/>
@@ -8504,13 +7576,30 @@
           <a:lstStyle/>
           <a:p>
             <a:r>
-              <a:rPr lang="en-US" sz="1000">
+              <a:rPr lang="it-IT" sz="1000" dirty="0">
                 <a:solidFill>
                   <a:srgbClr val="000000"/>
                 </a:solidFill>
                 <a:latin typeface="Adobe Clean Light" panose="020B0303020404020204" pitchFamily="34" charset="0"/>
               </a:rPr>
-              <a:t>Office Hours is an initiative led by the Adobe Customer Support team. These sessions are designed to inform as well as help participants troubleshoot problems and provide tips and tricks to be successful with Adobe Experience Cloud.</a:t>
+              <a:t>Office Hours è un’iniziativa nata dal team del Servizio clienti di Adobe. Queste sessioni sono progettate per informare e aiutare</a:t>
+            </a:r>
+            <a:br>
+              <a:rPr lang="sk-SK" sz="1000" dirty="0">
+                <a:solidFill>
+                  <a:srgbClr val="000000"/>
+                </a:solidFill>
+                <a:latin typeface="Adobe Clean Light" panose="020B0303020404020204" pitchFamily="34" charset="0"/>
+              </a:rPr>
+            </a:br>
+            <a:r>
+              <a:rPr lang="it-IT" sz="1000" dirty="0">
+                <a:solidFill>
+                  <a:srgbClr val="000000"/>
+                </a:solidFill>
+                <a:latin typeface="Adobe Clean Light" panose="020B0303020404020204" pitchFamily="34" charset="0"/>
+              </a:rPr>
+              <a:t>i partecipanti a risolvere problemi e fornire suggerimenti e trucchi utili per le soluzioni Adobe Experience Cloud.</a:t>
             </a:r>
           </a:p>
         </p:txBody>
@@ -8553,12 +7642,12 @@
               </a:spcAft>
             </a:pPr>
             <a:r>
-              <a:rPr lang="en-US" sz="1200" b="1">
+              <a:rPr lang="it-IT" sz="1200" b="1">
                 <a:latin typeface="+mj-lt"/>
                 <a:ea typeface="Open Sans" pitchFamily="34" charset="0"/>
                 <a:cs typeface="Open Sans" pitchFamily="34" charset="0"/>
               </a:rPr>
-              <a:t>24/7 Support Portal</a:t>
+              <a:t>Portale di supporto 24/7</a:t>
             </a:r>
           </a:p>
         </p:txBody>
@@ -8591,16 +7680,16 @@
           <a:lstStyle/>
           <a:p>
             <a:r>
-              <a:rPr lang="en-US" sz="1000">
+              <a:rPr lang="it-IT" sz="1000" dirty="0">
                 <a:solidFill>
                   <a:srgbClr val="000000"/>
                 </a:solidFill>
                 <a:latin typeface="Adobe Clean Light" panose="020B0303020404020204" pitchFamily="34" charset="0"/>
               </a:rPr>
-              <a:t>On-demand access to the online </a:t>
+              <a:t>Accesso on-demand al portale di assistenza autonoma per inviare richieste di supporto, esaminare lo stato dei casi e sfogliare altre risorse, come la knowledge base, notizie </a:t>
             </a:r>
             <a:br>
-              <a:rPr lang="en-US" sz="1000">
+              <a:rPr lang="sk-SK" sz="1000" dirty="0">
                 <a:solidFill>
                   <a:srgbClr val="000000"/>
                 </a:solidFill>
@@ -8608,13 +7697,13 @@
               </a:rPr>
             </a:br>
             <a:r>
-              <a:rPr lang="en-US" sz="1000">
+              <a:rPr lang="it-IT" sz="1000" dirty="0">
                 <a:solidFill>
                   <a:srgbClr val="000000"/>
                 </a:solidFill>
                 <a:latin typeface="Adobe Clean Light" panose="020B0303020404020204" pitchFamily="34" charset="0"/>
               </a:rPr>
-              <a:t>Self-help Support Portal to submit support requests, review case status, and browse other resources, like our knowledgebase, news and alerts, featured tips, and more.</a:t>
+              <a:t>e avvisi, suggerimenti e altro ancora.</a:t>
             </a:r>
           </a:p>
         </p:txBody>
@@ -8726,10 +7815,10 @@
           <a:lstStyle/>
           <a:p>
             <a:r>
-              <a:rPr lang="en-US" sz="1200" b="1">
+              <a:rPr lang="it-IT" sz="1200" b="1">
                 <a:latin typeface="+mj-lt"/>
               </a:rPr>
-              <a:t>Business Services</a:t>
+              <a:t>Servizi Business</a:t>
             </a:r>
           </a:p>
         </p:txBody>
@@ -8770,15 +7859,11 @@
               </a:spcBef>
             </a:pPr>
             <a:r>
-              <a:rPr lang="en-US" sz="1000">
+              <a:rPr lang="it-IT" sz="1000">
                 <a:latin typeface="Adobe Clean Light" panose="020B0303020404020204" pitchFamily="34" charset="0"/>
               </a:rPr>
-              <a:t>An Account Support Lead will host webinars covering an overview of business support services.  </a:t>
+              <a:t>Un Account Support Lead terrà dei webinar per illustrare i servizi di supporto Business.  </a:t>
             </a:r>
-            <a:endParaRPr lang="en-US" sz="1000">
-              <a:latin typeface="Adobe Clean Light" panose="020B0303020404020204" pitchFamily="34" charset="0"/>
-              <a:cs typeface="AdobeClean-Light"/>
-            </a:endParaRPr>
           </a:p>
         </p:txBody>
       </p:sp>
@@ -9247,12 +8332,12 @@
               <a:defRPr/>
             </a:pPr>
             <a:r>
-              <a:rPr lang="en-US" sz="1200">
+              <a:rPr lang="it-IT" sz="1200">
                 <a:solidFill>
                   <a:srgbClr val="000000"/>
                 </a:solidFill>
               </a:rPr>
-              <a:t>Self– Help Portal</a:t>
+              <a:t>Portale di assistenza autonoma</a:t>
             </a:r>
           </a:p>
         </p:txBody>
@@ -9300,7 +8385,7 @@
               <a:defRPr/>
             </a:pPr>
             <a:r>
-              <a:rPr lang="en-US" sz="1200">
+              <a:rPr lang="it-IT" sz="1200">
                 <a:solidFill>
                   <a:srgbClr val="000000"/>
                 </a:solidFill>
@@ -9362,49 +8447,15 @@
               </a:lnSpc>
             </a:pPr>
             <a:r>
-              <a:rPr sz="500" spc="-5">
+              <a:rPr lang="it-IT" sz="500">
                 <a:solidFill>
                   <a:srgbClr val="6C6C6C"/>
                 </a:solidFill>
                 <a:latin typeface="Adobe Clean"/>
                 <a:cs typeface="Adobe Clean"/>
               </a:rPr>
-              <a:t>©2020 Adobe. All Rights Reserved. </a:t>
+              <a:t>©2020 Adobe. All Rights Reserved. Adobe Confidential.</a:t>
             </a:r>
-            <a:r>
-              <a:rPr sz="500">
-                <a:solidFill>
-                  <a:srgbClr val="6C6C6C"/>
-                </a:solidFill>
-                <a:latin typeface="Adobe Clean"/>
-                <a:cs typeface="Adobe Clean"/>
-              </a:rPr>
-              <a:t>Adobe</a:t>
-            </a:r>
-            <a:r>
-              <a:rPr sz="500" spc="5">
-                <a:solidFill>
-                  <a:srgbClr val="6C6C6C"/>
-                </a:solidFill>
-                <a:latin typeface="Adobe Clean"/>
-                <a:cs typeface="Adobe Clean"/>
-              </a:rPr>
-              <a:t> </a:t>
-            </a:r>
-            <a:r>
-              <a:rPr sz="500" spc="-5">
-                <a:solidFill>
-                  <a:srgbClr val="6C6C6C"/>
-                </a:solidFill>
-                <a:latin typeface="Adobe Clean"/>
-                <a:cs typeface="Adobe Clean"/>
-              </a:rPr>
-              <a:t>Confidential.</a:t>
-            </a:r>
-            <a:endParaRPr sz="500">
-              <a:latin typeface="Adobe Clean"/>
-              <a:cs typeface="Adobe Clean"/>
-            </a:endParaRPr>
           </a:p>
           <a:p>
             <a:pPr>
@@ -9430,39 +8481,15 @@
               </a:spcBef>
             </a:pPr>
             <a:r>
-              <a:rPr sz="800" spc="-5">
+              <a:rPr lang="it-IT" sz="800">
                 <a:solidFill>
                   <a:srgbClr val="6D6D6D"/>
                 </a:solidFill>
                 <a:latin typeface="Adobe Clean"/>
                 <a:cs typeface="Adobe Clean"/>
               </a:rPr>
-              <a:t>©2020 Adobe. All Rights Reserved. Adobe</a:t>
+              <a:t>©2020 Adobe. All Rights Reserved. Adobe Confidential.</a:t>
             </a:r>
-            <a:r>
-              <a:rPr sz="800" spc="75">
-                <a:solidFill>
-                  <a:srgbClr val="6D6D6D"/>
-                </a:solidFill>
-                <a:latin typeface="Adobe Clean"/>
-                <a:cs typeface="Adobe Clean"/>
-              </a:rPr>
-              <a:t> </a:t>
-            </a:r>
-            <a:r>
-              <a:rPr sz="800" spc="-5">
-                <a:solidFill>
-                  <a:srgbClr val="6D6D6D"/>
-                </a:solidFill>
-                <a:latin typeface="Adobe Clean"/>
-                <a:cs typeface="Adobe Clean"/>
-              </a:rPr>
-              <a:t>Confidential.</a:t>
-            </a:r>
-            <a:endParaRPr sz="800">
-              <a:latin typeface="Adobe Clean"/>
-              <a:cs typeface="Adobe Clean"/>
-            </a:endParaRPr>
           </a:p>
         </p:txBody>
       </p:sp>
@@ -9546,19 +8573,15 @@
               </a:spcBef>
             </a:pPr>
             <a:r>
-              <a:rPr lang="en-US" sz="1400" b="1" spc="-15">
+              <a:rPr lang="it-IT" sz="1400" b="1">
                 <a:solidFill>
                   <a:srgbClr val="020302"/>
                 </a:solidFill>
                 <a:latin typeface="Adobe Clean"/>
                 <a:cs typeface="Adobe Clean"/>
               </a:rPr>
-              <a:t>Resources</a:t>
+              <a:t>Risorse</a:t>
             </a:r>
-            <a:endParaRPr sz="1400">
-              <a:latin typeface="Adobe Clean"/>
-              <a:cs typeface="Adobe Clean"/>
-            </a:endParaRPr>
           </a:p>
         </p:txBody>
       </p:sp>
@@ -9592,7 +8615,7 @@
               </a:spcBef>
             </a:pPr>
             <a:r>
-              <a:rPr sz="800" spc="-15">
+              <a:rPr lang="it-IT" sz="800">
                 <a:solidFill>
                   <a:srgbClr val="777879"/>
                 </a:solidFill>
@@ -9601,10 +8624,6 @@
               </a:rPr>
               <a:t>Adobe</a:t>
             </a:r>
-            <a:endParaRPr sz="800">
-              <a:latin typeface="Adobe Clean"/>
-              <a:cs typeface="Adobe Clean"/>
-            </a:endParaRPr>
           </a:p>
           <a:p>
             <a:pPr marL="12700">
@@ -9613,39 +8632,15 @@
               </a:lnSpc>
             </a:pPr>
             <a:r>
-              <a:rPr sz="800" spc="-15">
+              <a:rPr lang="it-IT" sz="800">
                 <a:solidFill>
                   <a:srgbClr val="777879"/>
                 </a:solidFill>
                 <a:latin typeface="Adobe Clean"/>
                 <a:cs typeface="Adobe Clean"/>
               </a:rPr>
-              <a:t>345 Park</a:t>
+              <a:t>345 Park Avenue</a:t>
             </a:r>
-            <a:r>
-              <a:rPr sz="800" spc="-100">
-                <a:solidFill>
-                  <a:srgbClr val="777879"/>
-                </a:solidFill>
-                <a:latin typeface="Adobe Clean"/>
-                <a:cs typeface="Adobe Clean"/>
-              </a:rPr>
-              <a:t> </a:t>
-            </a:r>
-            <a:r>
-              <a:rPr sz="800" spc="-15">
-                <a:solidFill>
-                  <a:srgbClr val="777879"/>
-                </a:solidFill>
-                <a:latin typeface="Adobe Clean"/>
-                <a:cs typeface="Adobe Clean"/>
-              </a:rPr>
-              <a:t>Avenue</a:t>
-            </a:r>
-            <a:endParaRPr sz="800">
-              <a:latin typeface="Adobe Clean"/>
-              <a:cs typeface="Adobe Clean"/>
-            </a:endParaRPr>
           </a:p>
           <a:p>
             <a:pPr marL="12700">
@@ -9654,49 +8649,15 @@
               </a:lnSpc>
             </a:pPr>
             <a:r>
-              <a:rPr sz="800" spc="-10">
+              <a:rPr lang="it-IT" sz="800">
                 <a:solidFill>
                   <a:srgbClr val="777879"/>
                 </a:solidFill>
                 <a:latin typeface="Adobe Clean"/>
                 <a:cs typeface="Adobe Clean"/>
               </a:rPr>
-              <a:t>San </a:t>
+              <a:t>San Jose, CA 95110-2704</a:t>
             </a:r>
-            <a:r>
-              <a:rPr sz="800" spc="-15">
-                <a:solidFill>
-                  <a:srgbClr val="777879"/>
-                </a:solidFill>
-                <a:latin typeface="Adobe Clean"/>
-                <a:cs typeface="Adobe Clean"/>
-              </a:rPr>
-              <a:t>Jose,</a:t>
-            </a:r>
-            <a:r>
-              <a:rPr sz="800" spc="-140">
-                <a:solidFill>
-                  <a:srgbClr val="777879"/>
-                </a:solidFill>
-                <a:latin typeface="Adobe Clean"/>
-                <a:cs typeface="Adobe Clean"/>
-              </a:rPr>
-              <a:t> </a:t>
-            </a:r>
-            <a:r>
-              <a:rPr sz="800" spc="-20">
-                <a:solidFill>
-                  <a:srgbClr val="777879"/>
-                </a:solidFill>
-                <a:latin typeface="Adobe Clean"/>
-                <a:cs typeface="Adobe Clean"/>
-              </a:rPr>
-              <a:t>CA95110-2704</a:t>
-            </a:r>
-            <a:endParaRPr sz="800">
-              <a:latin typeface="Adobe Clean"/>
-              <a:cs typeface="Adobe Clean"/>
-            </a:endParaRPr>
           </a:p>
           <a:p>
             <a:pPr marL="12700">
@@ -9708,7 +8669,7 @@
               </a:spcBef>
             </a:pPr>
             <a:r>
-              <a:rPr sz="800" spc="-10">
+              <a:rPr lang="it-IT" sz="800">
                 <a:solidFill>
                   <a:srgbClr val="777879"/>
                 </a:solidFill>
@@ -9717,10 +8678,6 @@
               </a:rPr>
               <a:t>USA</a:t>
             </a:r>
-            <a:endParaRPr sz="800">
-              <a:latin typeface="Adobe Clean"/>
-              <a:cs typeface="Adobe Clean"/>
-            </a:endParaRPr>
           </a:p>
           <a:p>
             <a:pPr marL="12700">
@@ -9732,7 +8689,7 @@
               </a:spcBef>
             </a:pPr>
             <a:r>
-              <a:rPr sz="800" u="sng" spc="-25">
+              <a:rPr lang="it-IT" sz="800" u="sng">
                 <a:solidFill>
                   <a:srgbClr val="5F5F5F"/>
                 </a:solidFill>
@@ -9747,10 +8704,6 @@
               </a:rPr>
               <a:t>www.adobe.com</a:t>
             </a:r>
-            <a:endParaRPr sz="800">
-              <a:latin typeface="Adobe Clean"/>
-              <a:cs typeface="Adobe Clean"/>
-            </a:endParaRPr>
           </a:p>
         </p:txBody>
       </p:sp>
@@ -9925,409 +8878,15 @@
               </a:spcBef>
             </a:pPr>
             <a:r>
-              <a:rPr sz="1100" i="1" spc="-10">
+              <a:rPr lang="it-IT" sz="1100" i="1">
                 <a:solidFill>
                   <a:srgbClr val="777879"/>
                 </a:solidFill>
                 <a:latin typeface="AdobeClean-LightIt"/>
                 <a:cs typeface="AdobeClean-LightIt"/>
               </a:rPr>
-              <a:t>To</a:t>
+              <a:t>Per saperne di più sulle opzioni di Supporto Adobe e capire quale sia il livello più adatto alle tue esigenze, contatta il tuo Named Account Manager (NAM) o Customer Success Manager (CSM).</a:t>
             </a:r>
-            <a:r>
-              <a:rPr sz="1100" i="1" spc="-50">
-                <a:solidFill>
-                  <a:srgbClr val="777879"/>
-                </a:solidFill>
-                <a:latin typeface="AdobeClean-LightIt"/>
-                <a:cs typeface="AdobeClean-LightIt"/>
-              </a:rPr>
-              <a:t> </a:t>
-            </a:r>
-            <a:r>
-              <a:rPr sz="1100" i="1" spc="-15">
-                <a:solidFill>
-                  <a:srgbClr val="777879"/>
-                </a:solidFill>
-                <a:latin typeface="AdobeClean-LightIt"/>
-                <a:cs typeface="AdobeClean-LightIt"/>
-              </a:rPr>
-              <a:t>learn</a:t>
-            </a:r>
-            <a:r>
-              <a:rPr sz="1100" i="1" spc="-40">
-                <a:solidFill>
-                  <a:srgbClr val="777879"/>
-                </a:solidFill>
-                <a:latin typeface="AdobeClean-LightIt"/>
-                <a:cs typeface="AdobeClean-LightIt"/>
-              </a:rPr>
-              <a:t> </a:t>
-            </a:r>
-            <a:r>
-              <a:rPr sz="1100" i="1" spc="-15">
-                <a:solidFill>
-                  <a:srgbClr val="777879"/>
-                </a:solidFill>
-                <a:latin typeface="AdobeClean-LightIt"/>
-                <a:cs typeface="AdobeClean-LightIt"/>
-              </a:rPr>
-              <a:t>more</a:t>
-            </a:r>
-            <a:r>
-              <a:rPr sz="1100" i="1" spc="-45">
-                <a:solidFill>
-                  <a:srgbClr val="777879"/>
-                </a:solidFill>
-                <a:latin typeface="AdobeClean-LightIt"/>
-                <a:cs typeface="AdobeClean-LightIt"/>
-              </a:rPr>
-              <a:t> </a:t>
-            </a:r>
-            <a:r>
-              <a:rPr sz="1100" i="1" spc="-15">
-                <a:solidFill>
-                  <a:srgbClr val="777879"/>
-                </a:solidFill>
-                <a:latin typeface="AdobeClean-LightIt"/>
-                <a:cs typeface="AdobeClean-LightIt"/>
-              </a:rPr>
-              <a:t>about</a:t>
-            </a:r>
-            <a:r>
-              <a:rPr sz="1100" i="1" spc="-45">
-                <a:solidFill>
-                  <a:srgbClr val="777879"/>
-                </a:solidFill>
-                <a:latin typeface="AdobeClean-LightIt"/>
-                <a:cs typeface="AdobeClean-LightIt"/>
-              </a:rPr>
-              <a:t> </a:t>
-            </a:r>
-            <a:r>
-              <a:rPr sz="1100" i="1" spc="-15">
-                <a:solidFill>
-                  <a:srgbClr val="777879"/>
-                </a:solidFill>
-                <a:latin typeface="AdobeClean-LightIt"/>
-                <a:cs typeface="AdobeClean-LightIt"/>
-              </a:rPr>
-              <a:t>Adobe</a:t>
-            </a:r>
-            <a:r>
-              <a:rPr sz="1100" i="1" spc="-50">
-                <a:solidFill>
-                  <a:srgbClr val="777879"/>
-                </a:solidFill>
-                <a:latin typeface="AdobeClean-LightIt"/>
-                <a:cs typeface="AdobeClean-LightIt"/>
-              </a:rPr>
-              <a:t> </a:t>
-            </a:r>
-            <a:r>
-              <a:rPr sz="1100" i="1" spc="-15">
-                <a:solidFill>
-                  <a:srgbClr val="777879"/>
-                </a:solidFill>
-                <a:latin typeface="AdobeClean-LightIt"/>
-                <a:cs typeface="AdobeClean-LightIt"/>
-              </a:rPr>
-              <a:t>Support</a:t>
-            </a:r>
-            <a:r>
-              <a:rPr lang="en-US" sz="1100" i="1" spc="-15">
-                <a:solidFill>
-                  <a:srgbClr val="777879"/>
-                </a:solidFill>
-                <a:latin typeface="AdobeClean-LightIt"/>
-                <a:cs typeface="AdobeClean-LightIt"/>
-              </a:rPr>
-              <a:t> Offerings</a:t>
-            </a:r>
-            <a:r>
-              <a:rPr sz="1100" i="1" spc="-75">
-                <a:solidFill>
-                  <a:srgbClr val="777879"/>
-                </a:solidFill>
-                <a:latin typeface="AdobeClean-LightIt"/>
-                <a:cs typeface="AdobeClean-LightIt"/>
-              </a:rPr>
-              <a:t> </a:t>
-            </a:r>
-            <a:r>
-              <a:rPr sz="1100" i="1" spc="-15">
-                <a:solidFill>
-                  <a:srgbClr val="777879"/>
-                </a:solidFill>
-                <a:latin typeface="AdobeClean-LightIt"/>
-                <a:cs typeface="AdobeClean-LightIt"/>
-              </a:rPr>
-              <a:t>and</a:t>
-            </a:r>
-            <a:r>
-              <a:rPr sz="1100" i="1" spc="-50">
-                <a:solidFill>
-                  <a:srgbClr val="777879"/>
-                </a:solidFill>
-                <a:latin typeface="AdobeClean-LightIt"/>
-                <a:cs typeface="AdobeClean-LightIt"/>
-              </a:rPr>
-              <a:t> </a:t>
-            </a:r>
-            <a:r>
-              <a:rPr sz="1100" i="1" spc="-15">
-                <a:solidFill>
-                  <a:srgbClr val="777879"/>
-                </a:solidFill>
-                <a:latin typeface="AdobeClean-LightIt"/>
-                <a:cs typeface="AdobeClean-LightIt"/>
-              </a:rPr>
-              <a:t>the</a:t>
-            </a:r>
-            <a:r>
-              <a:rPr sz="1100" i="1" spc="-55">
-                <a:solidFill>
-                  <a:srgbClr val="777879"/>
-                </a:solidFill>
-                <a:latin typeface="AdobeClean-LightIt"/>
-                <a:cs typeface="AdobeClean-LightIt"/>
-              </a:rPr>
-              <a:t> </a:t>
-            </a:r>
-            <a:r>
-              <a:rPr sz="1100" i="1" spc="-15">
-                <a:solidFill>
-                  <a:srgbClr val="777879"/>
-                </a:solidFill>
-                <a:latin typeface="AdobeClean-LightIt"/>
-                <a:cs typeface="AdobeClean-LightIt"/>
-              </a:rPr>
-              <a:t>right</a:t>
-            </a:r>
-            <a:r>
-              <a:rPr sz="1100" i="1" spc="-95">
-                <a:solidFill>
-                  <a:srgbClr val="777879"/>
-                </a:solidFill>
-                <a:latin typeface="AdobeClean-LightIt"/>
-                <a:cs typeface="AdobeClean-LightIt"/>
-              </a:rPr>
-              <a:t> </a:t>
-            </a:r>
-            <a:r>
-              <a:rPr sz="1100" i="1" spc="-15">
-                <a:solidFill>
-                  <a:srgbClr val="777879"/>
-                </a:solidFill>
-                <a:latin typeface="AdobeClean-LightIt"/>
-                <a:cs typeface="AdobeClean-LightIt"/>
-              </a:rPr>
-              <a:t>level</a:t>
-            </a:r>
-            <a:r>
-              <a:rPr sz="1100" i="1" spc="-55">
-                <a:solidFill>
-                  <a:srgbClr val="777879"/>
-                </a:solidFill>
-                <a:latin typeface="AdobeClean-LightIt"/>
-                <a:cs typeface="AdobeClean-LightIt"/>
-              </a:rPr>
-              <a:t> </a:t>
-            </a:r>
-            <a:r>
-              <a:rPr sz="1100" i="1" spc="-15">
-                <a:solidFill>
-                  <a:srgbClr val="777879"/>
-                </a:solidFill>
-                <a:latin typeface="AdobeClean-LightIt"/>
-                <a:cs typeface="AdobeClean-LightIt"/>
-              </a:rPr>
-              <a:t>for</a:t>
-            </a:r>
-            <a:r>
-              <a:rPr sz="1100" i="1" spc="-85">
-                <a:solidFill>
-                  <a:srgbClr val="777879"/>
-                </a:solidFill>
-                <a:latin typeface="AdobeClean-LightIt"/>
-                <a:cs typeface="AdobeClean-LightIt"/>
-              </a:rPr>
-              <a:t> </a:t>
-            </a:r>
-            <a:r>
-              <a:rPr sz="1100" i="1" spc="-15">
-                <a:solidFill>
-                  <a:srgbClr val="777879"/>
-                </a:solidFill>
-                <a:latin typeface="AdobeClean-LightIt"/>
-                <a:cs typeface="AdobeClean-LightIt"/>
-              </a:rPr>
-              <a:t>you,</a:t>
-            </a:r>
-            <a:r>
-              <a:rPr sz="1100" i="1" spc="-65">
-                <a:solidFill>
-                  <a:srgbClr val="777879"/>
-                </a:solidFill>
-                <a:latin typeface="AdobeClean-LightIt"/>
-                <a:cs typeface="AdobeClean-LightIt"/>
-              </a:rPr>
-              <a:t> </a:t>
-            </a:r>
-            <a:r>
-              <a:rPr sz="1100" i="1" spc="-15">
-                <a:solidFill>
-                  <a:srgbClr val="777879"/>
-                </a:solidFill>
-                <a:latin typeface="AdobeClean-LightIt"/>
-                <a:cs typeface="AdobeClean-LightIt"/>
-              </a:rPr>
-              <a:t>contact</a:t>
-            </a:r>
-            <a:r>
-              <a:rPr sz="1100" i="1" spc="-85">
-                <a:solidFill>
-                  <a:srgbClr val="777879"/>
-                </a:solidFill>
-                <a:latin typeface="AdobeClean-LightIt"/>
-                <a:cs typeface="AdobeClean-LightIt"/>
-              </a:rPr>
-              <a:t> </a:t>
-            </a:r>
-            <a:r>
-              <a:rPr sz="1100" i="1" spc="-15">
-                <a:solidFill>
-                  <a:srgbClr val="777879"/>
-                </a:solidFill>
-                <a:latin typeface="AdobeClean-LightIt"/>
-                <a:cs typeface="AdobeClean-LightIt"/>
-              </a:rPr>
-              <a:t>your</a:t>
-            </a:r>
-            <a:r>
-              <a:rPr sz="1100" i="1" spc="-70">
-                <a:solidFill>
-                  <a:srgbClr val="777879"/>
-                </a:solidFill>
-                <a:latin typeface="AdobeClean-LightIt"/>
-                <a:cs typeface="AdobeClean-LightIt"/>
-              </a:rPr>
-              <a:t> </a:t>
-            </a:r>
-            <a:r>
-              <a:rPr sz="1100" i="1" spc="-15">
-                <a:solidFill>
-                  <a:srgbClr val="777879"/>
-                </a:solidFill>
-                <a:latin typeface="AdobeClean-LightIt"/>
-                <a:cs typeface="AdobeClean-LightIt"/>
-              </a:rPr>
-              <a:t>Named</a:t>
-            </a:r>
-            <a:r>
-              <a:rPr sz="1100" i="1" spc="-55">
-                <a:solidFill>
-                  <a:srgbClr val="777879"/>
-                </a:solidFill>
-                <a:latin typeface="AdobeClean-LightIt"/>
-                <a:cs typeface="AdobeClean-LightIt"/>
-              </a:rPr>
-              <a:t> </a:t>
-            </a:r>
-            <a:r>
-              <a:rPr sz="1100" i="1" spc="-25">
-                <a:solidFill>
-                  <a:srgbClr val="777879"/>
-                </a:solidFill>
-                <a:latin typeface="AdobeClean-LightIt"/>
-                <a:cs typeface="AdobeClean-LightIt"/>
-              </a:rPr>
-              <a:t>Account</a:t>
-            </a:r>
-            <a:r>
-              <a:rPr sz="1100" i="1" spc="-120">
-                <a:solidFill>
-                  <a:srgbClr val="777879"/>
-                </a:solidFill>
-                <a:latin typeface="AdobeClean-LightIt"/>
-                <a:cs typeface="AdobeClean-LightIt"/>
-              </a:rPr>
-              <a:t> </a:t>
-            </a:r>
-            <a:r>
-              <a:rPr sz="1100" i="1" spc="-20">
-                <a:solidFill>
-                  <a:srgbClr val="777879"/>
-                </a:solidFill>
-                <a:latin typeface="AdobeClean-LightIt"/>
-                <a:cs typeface="AdobeClean-LightIt"/>
-              </a:rPr>
-              <a:t>Manager  </a:t>
-            </a:r>
-            <a:r>
-              <a:rPr sz="1100" i="1" spc="-15">
-                <a:solidFill>
-                  <a:srgbClr val="777879"/>
-                </a:solidFill>
-                <a:latin typeface="AdobeClean-LightIt"/>
-                <a:cs typeface="AdobeClean-LightIt"/>
-              </a:rPr>
-              <a:t>(NAM) </a:t>
-            </a:r>
-            <a:r>
-              <a:rPr sz="1100" i="1" spc="-10">
-                <a:solidFill>
-                  <a:srgbClr val="777879"/>
-                </a:solidFill>
-                <a:latin typeface="AdobeClean-LightIt"/>
-                <a:cs typeface="AdobeClean-LightIt"/>
-              </a:rPr>
-              <a:t>or </a:t>
-            </a:r>
-            <a:r>
-              <a:rPr sz="1100" i="1" spc="-15">
-                <a:solidFill>
-                  <a:srgbClr val="777879"/>
-                </a:solidFill>
-                <a:latin typeface="AdobeClean-LightIt"/>
-                <a:cs typeface="AdobeClean-LightIt"/>
-              </a:rPr>
-              <a:t>Customer </a:t>
-            </a:r>
-            <a:r>
-              <a:rPr sz="1100" i="1" spc="-20">
-                <a:solidFill>
-                  <a:srgbClr val="777879"/>
-                </a:solidFill>
-                <a:latin typeface="AdobeClean-LightIt"/>
-                <a:cs typeface="AdobeClean-LightIt"/>
-              </a:rPr>
-              <a:t>Success</a:t>
-            </a:r>
-            <a:r>
-              <a:rPr sz="1100" i="1" spc="-180">
-                <a:solidFill>
-                  <a:srgbClr val="777879"/>
-                </a:solidFill>
-                <a:latin typeface="AdobeClean-LightIt"/>
-                <a:cs typeface="AdobeClean-LightIt"/>
-              </a:rPr>
-              <a:t> </a:t>
-            </a:r>
-            <a:r>
-              <a:rPr sz="1100" i="1" spc="-15">
-                <a:solidFill>
-                  <a:srgbClr val="777879"/>
-                </a:solidFill>
-                <a:latin typeface="AdobeClean-LightIt"/>
-                <a:cs typeface="AdobeClean-LightIt"/>
-              </a:rPr>
-              <a:t>Manager(CSM)</a:t>
-            </a:r>
-            <a:endParaRPr sz="1100">
-              <a:latin typeface="AdobeClean-LightIt"/>
-              <a:cs typeface="AdobeClean-LightIt"/>
-            </a:endParaRPr>
           </a:p>
           <a:p>
             <a:pPr marL="34290">
@@ -10339,59 +8898,15 @@
               </a:spcBef>
             </a:pPr>
             <a:r>
-              <a:rPr sz="800" spc="-5">
+              <a:rPr lang="it-IT" sz="800">
                 <a:solidFill>
                   <a:srgbClr val="6D6D6D"/>
                 </a:solidFill>
                 <a:latin typeface="Adobe Clean"/>
                 <a:cs typeface="Adobe Clean"/>
               </a:rPr>
-              <a:t>©202</a:t>
+              <a:t>©2021 Adobe. All Rights Reserved. Adobe Confidential.</a:t>
             </a:r>
-            <a:r>
-              <a:rPr lang="en-US" sz="800" spc="-5">
-                <a:solidFill>
-                  <a:srgbClr val="6D6D6D"/>
-                </a:solidFill>
-                <a:latin typeface="Adobe Clean"/>
-                <a:cs typeface="Adobe Clean"/>
-              </a:rPr>
-              <a:t>1</a:t>
-            </a:r>
-            <a:r>
-              <a:rPr sz="800" spc="-5">
-                <a:solidFill>
-                  <a:srgbClr val="6D6D6D"/>
-                </a:solidFill>
-                <a:latin typeface="Adobe Clean"/>
-                <a:cs typeface="Adobe Clean"/>
-              </a:rPr>
-              <a:t> Adobe. All Rights Reserved. Adobe</a:t>
-            </a:r>
-            <a:r>
-              <a:rPr sz="800" spc="75">
-                <a:solidFill>
-                  <a:srgbClr val="6D6D6D"/>
-                </a:solidFill>
-                <a:latin typeface="Adobe Clean"/>
-                <a:cs typeface="Adobe Clean"/>
-              </a:rPr>
-              <a:t> </a:t>
-            </a:r>
-            <a:r>
-              <a:rPr sz="800" spc="-5">
-                <a:solidFill>
-                  <a:srgbClr val="6D6D6D"/>
-                </a:solidFill>
-                <a:latin typeface="Adobe Clean"/>
-                <a:cs typeface="Adobe Clean"/>
-              </a:rPr>
-              <a:t>Confidential.</a:t>
-            </a:r>
-            <a:endParaRPr sz="800">
-              <a:latin typeface="Adobe Clean"/>
-              <a:cs typeface="Adobe Clean"/>
-            </a:endParaRPr>
           </a:p>
         </p:txBody>
       </p:sp>
@@ -10428,19 +8943,15 @@
               </a:spcBef>
             </a:pPr>
             <a:r>
-              <a:rPr lang="en-US" sz="1400" b="1" spc="-15">
+              <a:rPr lang="it-IT" sz="1400" b="1">
                 <a:solidFill>
                   <a:srgbClr val="020302"/>
                 </a:solidFill>
                 <a:latin typeface="Adobe Clean"/>
                 <a:cs typeface="Adobe Clean"/>
               </a:rPr>
-              <a:t>Regional scope of Adobe Support, Local Hours Of Operation And Language Support</a:t>
+              <a:t>Supporto Adobe: aree geografiche, orari operativi e lingue</a:t>
             </a:r>
-            <a:endParaRPr lang="en-US" sz="1400" spc="-15">
-              <a:ea typeface="+mn-lt"/>
-              <a:cs typeface="+mn-lt"/>
-            </a:endParaRPr>
           </a:p>
           <a:p>
             <a:pPr>
@@ -10449,15 +8960,14 @@
               </a:spcBef>
             </a:pPr>
             <a:r>
-              <a:rPr lang="en-US" sz="1000" spc="-15">
+              <a:rPr lang="it-IT" sz="1000">
                 <a:solidFill>
                   <a:srgbClr val="1F1F1F"/>
                 </a:solidFill>
                 <a:latin typeface="AdobeClean-Light"/>
               </a:rPr>
-              <a:t>The Regional scope of Adobe Support is established by aligning the customer's billing address (via the Sales Order or other Adobe Support purchasing document) to one of the following regions:</a:t>
+              <a:t>L’ambito del supporto Adobe è definito allineando l’indirizzo di fatturazione del cliente (in base all’ordine di vendita o altro documento di acquisto del servizio di supporto Adobe) a una delle seguenti aree geografiche:</a:t>
             </a:r>
-            <a:endParaRPr lang="en-US"/>
           </a:p>
         </p:txBody>
       </p:sp>
@@ -10529,13 +9039,13 @@
                     <a:p>
                       <a:pPr algn="ctr"/>
                       <a:r>
-                        <a:rPr lang="en-US" sz="1100" dirty="0">
+                        <a:rPr lang="it-IT" sz="1100">
                           <a:solidFill>
                             <a:schemeClr val="tx1"/>
                           </a:solidFill>
                           <a:latin typeface="Adobe Clean"/>
                         </a:rPr>
-                        <a:t>Americas</a:t>
+                        <a:t>Americhe</a:t>
                       </a:r>
                     </a:p>
                   </a:txBody>
@@ -10594,13 +9104,13 @@
                     <a:p>
                       <a:pPr algn="ctr"/>
                       <a:r>
-                        <a:rPr lang="en-US" sz="1100" dirty="0">
+                        <a:rPr lang="it-IT" sz="1100">
                           <a:solidFill>
                             <a:schemeClr val="tx1"/>
                           </a:solidFill>
                           <a:latin typeface="Adobe Clean"/>
                         </a:rPr>
-                        <a:t>Europe, Middle East &amp; Africa</a:t>
+                        <a:t>Europa, Medio Oriente e Africa</a:t>
                       </a:r>
                     </a:p>
                   </a:txBody>
@@ -10659,13 +9169,13 @@
                     <a:p>
                       <a:pPr algn="ctr"/>
                       <a:r>
-                        <a:rPr lang="en-US" sz="1100" dirty="0">
+                        <a:rPr lang="it-IT" sz="1100">
                           <a:solidFill>
                             <a:schemeClr val="tx1"/>
                           </a:solidFill>
                           <a:latin typeface="Adobe Clean"/>
                         </a:rPr>
-                        <a:t>Asia Pacific</a:t>
+                        <a:t>Asia-Pacifico</a:t>
                       </a:r>
                     </a:p>
                   </a:txBody>
@@ -10724,16 +9234,16 @@
                     <a:p>
                       <a:pPr algn="ctr"/>
                       <a:r>
-                        <a:rPr lang="en-US" sz="1100" dirty="0">
+                        <a:rPr lang="it-IT" sz="1100">
                           <a:solidFill>
                             <a:schemeClr val="tx1"/>
                           </a:solidFill>
                           <a:latin typeface="Adobe Clean"/>
                         </a:rPr>
-                        <a:t>Japan </a:t>
+                        <a:t>Giappone</a:t>
                       </a:r>
                       <a:r>
-                        <a:rPr lang="en-US" sz="1100" baseline="30000" dirty="0">
+                        <a:rPr lang="it-IT" sz="1100" baseline="30000">
                           <a:solidFill>
                             <a:schemeClr val="tx1"/>
                           </a:solidFill>
@@ -10741,12 +9251,6 @@
                         </a:rPr>
                         <a:t>1 </a:t>
                       </a:r>
-                      <a:endParaRPr lang="en-US" sz="1100">
-                        <a:solidFill>
-                          <a:schemeClr val="tx1"/>
-                        </a:solidFill>
-                        <a:latin typeface="Adobe Clean" panose="020B0503020404020204" pitchFamily="34" charset="0"/>
-                      </a:endParaRPr>
                     </a:p>
                   </a:txBody>
                   <a:tcPr anchor="ctr">
@@ -10811,13 +9315,13 @@
                     <a:p>
                       <a:pPr algn="ctr"/>
                       <a:r>
-                        <a:rPr lang="en-US" sz="1100" dirty="0">
+                        <a:rPr lang="it-IT" sz="1100">
                           <a:solidFill>
                             <a:schemeClr val="tx1"/>
                           </a:solidFill>
                           <a:latin typeface="Adobe Clean"/>
                         </a:rPr>
-                        <a:t>6 am – 5:30 pm</a:t>
+                        <a:t>06:00 – 17:30</a:t>
                       </a:r>
                     </a:p>
                   </a:txBody>
@@ -10876,13 +9380,13 @@
                     <a:p>
                       <a:pPr algn="ctr"/>
                       <a:r>
-                        <a:rPr lang="en-US" sz="1100" dirty="0">
+                        <a:rPr lang="it-IT" sz="1100">
                           <a:solidFill>
                             <a:schemeClr val="tx1"/>
                           </a:solidFill>
                           <a:latin typeface="Adobe Clean"/>
                         </a:rPr>
-                        <a:t>9 am – 5 pm</a:t>
+                        <a:t>09:00 – 17:00</a:t>
                       </a:r>
                     </a:p>
                   </a:txBody>
@@ -10941,13 +9445,13 @@
                     <a:p>
                       <a:pPr algn="ctr"/>
                       <a:r>
-                        <a:rPr lang="en-US" sz="1100" dirty="0">
+                        <a:rPr lang="it-IT" sz="1100">
                           <a:solidFill>
                             <a:schemeClr val="tx1"/>
                           </a:solidFill>
                           <a:latin typeface="Adobe Clean"/>
                         </a:rPr>
-                        <a:t>9 am – 5 pm</a:t>
+                        <a:t>09:00 – 17:00</a:t>
                       </a:r>
                     </a:p>
                   </a:txBody>
@@ -11006,13 +9510,13 @@
                     <a:p>
                       <a:pPr algn="ctr"/>
                       <a:r>
-                        <a:rPr lang="en-US" sz="1100" dirty="0">
+                        <a:rPr lang="it-IT" sz="1100">
                           <a:solidFill>
                             <a:schemeClr val="tx1"/>
                           </a:solidFill>
                           <a:latin typeface="Adobe Clean"/>
                         </a:rPr>
-                        <a:t>9 am – 5:30 pm</a:t>
+                        <a:t>09:00 – 17:30</a:t>
                       </a:r>
                     </a:p>
                   </a:txBody>
@@ -11092,11 +9596,10 @@
                         <a:buNone/>
                       </a:pPr>
                       <a:r>
-                        <a:rPr lang="en-US" sz="1100" b="1" i="0" u="none" strike="noStrike" kern="0" cap="none" spc="0" normalizeH="0" baseline="30000" noProof="0" dirty="0">
+                        <a:rPr lang="it-IT" sz="1100" b="1" i="0" u="none" strike="noStrike" cap="none" normalizeH="0" baseline="30000" noProof="0">
                           <a:ln>
                             <a:noFill/>
                           </a:ln>
-                          <a:effectLst/>
                           <a:uLnTx/>
                           <a:uFillTx/>
                           <a:latin typeface="Adobe Clean"/>
@@ -11106,17 +9609,16 @@
                         <a:t> </a:t>
                       </a:r>
                       <a:r>
-                        <a:rPr lang="en-US" sz="1100" dirty="0">
+                        <a:rPr lang="it-IT" sz="1100">
                           <a:solidFill>
                             <a:schemeClr val="tx1"/>
                           </a:solidFill>
                           <a:latin typeface="Adobe Clean"/>
+                          <a:ea typeface="+mn-ea"/>
+                          <a:cs typeface="+mn-cs"/>
                         </a:rPr>
-                        <a:t>Language support is only available in English and Japanese.</a:t>
+                        <a:t>Il supporto è disponibile solo in inglese e giapponese.</a:t>
                       </a:r>
-                      <a:endParaRPr lang="en-US" dirty="0">
-                        <a:latin typeface="Adobe Clean"/>
-                      </a:endParaRPr>
                     </a:p>
                     <a:p>
                       <a:pPr marL="0" marR="0" lvl="0" indent="0" algn="ctr">
@@ -11135,17 +9637,17 @@
                         <a:buNone/>
                       </a:pPr>
                       <a:r>
-                        <a:rPr lang="en-US" sz="1100" i="1" dirty="0">
+                        <a:rPr lang="it-IT" sz="1100" i="1">
                           <a:solidFill>
                             <a:schemeClr val="tx1"/>
                           </a:solidFill>
                           <a:latin typeface="Adobe Clean"/>
                         </a:rPr>
-                        <a:t>*Adobe Commerce excludes Japanese languages support.</a:t>
+                        <a:t>* Adobe Commerce non prevede il supporto in lingua giapponese.</a:t>
                       </a:r>
                     </a:p>
                     <a:p>
-                      <a:pPr algn="ctr"/>
+                      <a:pPr algn="l" rtl="0"/>
                       <a:endParaRPr kumimoji="0" lang="en-US" sz="1100" b="1" i="0" u="none" strike="noStrike" kern="0" cap="none" spc="0" normalizeH="0" baseline="30000" noProof="0">
                         <a:ln>
                           <a:noFill/>
@@ -11164,7 +9666,7 @@
                     <a:p>
                       <a:pPr algn="ctr"/>
                       <a:r>
-                        <a:rPr lang="en-US" sz="1100" i="0" dirty="0">
+                        <a:rPr lang="it-IT" sz="1100" i="0">
                           <a:solidFill>
                             <a:schemeClr val="tx1"/>
                           </a:solidFill>
@@ -11173,7 +9675,7 @@
                         <a:t> </a:t>
                       </a:r>
                       <a:r>
-                        <a:rPr lang="en-US" sz="1100" i="0" baseline="30000" dirty="0">
+                        <a:rPr lang="it-IT" sz="1100" i="0" baseline="30000">
                           <a:solidFill>
                             <a:schemeClr val="tx1"/>
                           </a:solidFill>
@@ -11182,20 +9684,14 @@
                         <a:t>1 </a:t>
                       </a:r>
                       <a:r>
-                        <a:rPr lang="en-US" sz="1100" i="0" dirty="0">
+                        <a:rPr lang="it-IT" sz="1100" i="0">
                           <a:solidFill>
                             <a:schemeClr val="tx1"/>
                           </a:solidFill>
                           <a:latin typeface="Adobe Clean"/>
                         </a:rPr>
-                        <a:t>P2, P3, P4 cases are limited to business hours only in Japan.</a:t>
+                        <a:t>In Giappone, i casi P2, P3 e P4 sono limitati al solo orario operativo.</a:t>
                       </a:r>
-                      <a:endParaRPr lang="en-US" sz="1100" b="1" i="0">
-                        <a:solidFill>
-                          <a:schemeClr val="tx1"/>
-                        </a:solidFill>
-                        <a:latin typeface="Adobe Clean"/>
-                      </a:endParaRPr>
                     </a:p>
                   </a:txBody>
                   <a:tcPr anchor="ctr">
@@ -11559,129 +10055,15 @@
               </a:spcBef>
             </a:pPr>
             <a:r>
-              <a:rPr sz="1200" b="1" spc="-15">
+              <a:rPr lang="it-IT" sz="1200" b="1">
                 <a:solidFill>
                   <a:srgbClr val="FFFFFF"/>
                 </a:solidFill>
                 <a:latin typeface="Adobe Clean"/>
                 <a:cs typeface="Adobe Clean"/>
               </a:rPr>
-              <a:t>U</a:t>
+              <a:t>Eccellenza tecnica</a:t>
             </a:r>
-            <a:r>
-              <a:rPr sz="1200" b="1" spc="-20">
-                <a:solidFill>
-                  <a:srgbClr val="FFFFFF"/>
-                </a:solidFill>
-                <a:latin typeface="Adobe Clean"/>
-                <a:cs typeface="Adobe Clean"/>
-              </a:rPr>
-              <a:t>n</a:t>
-            </a:r>
-            <a:r>
-              <a:rPr sz="1200" b="1" spc="-25">
-                <a:solidFill>
-                  <a:srgbClr val="FFFFFF"/>
-                </a:solidFill>
-                <a:latin typeface="Adobe Clean"/>
-                <a:cs typeface="Adobe Clean"/>
-              </a:rPr>
-              <a:t>p</a:t>
-            </a:r>
-            <a:r>
-              <a:rPr sz="1200" b="1" spc="-15">
-                <a:solidFill>
-                  <a:srgbClr val="FFFFFF"/>
-                </a:solidFill>
-                <a:latin typeface="Adobe Clean"/>
-                <a:cs typeface="Adobe Clean"/>
-              </a:rPr>
-              <a:t>a</a:t>
-            </a:r>
-            <a:r>
-              <a:rPr sz="1200" b="1" spc="-25">
-                <a:solidFill>
-                  <a:srgbClr val="FFFFFF"/>
-                </a:solidFill>
-                <a:latin typeface="Adobe Clean"/>
-                <a:cs typeface="Adobe Clean"/>
-              </a:rPr>
-              <a:t>r</a:t>
-            </a:r>
-            <a:r>
-              <a:rPr sz="1200" b="1" spc="-15">
-                <a:solidFill>
-                  <a:srgbClr val="FFFFFF"/>
-                </a:solidFill>
-                <a:latin typeface="Adobe Clean"/>
-                <a:cs typeface="Adobe Clean"/>
-              </a:rPr>
-              <a:t>a</a:t>
-            </a:r>
-            <a:r>
-              <a:rPr sz="1200" b="1" spc="-30">
-                <a:solidFill>
-                  <a:srgbClr val="FFFFFF"/>
-                </a:solidFill>
-                <a:latin typeface="Adobe Clean"/>
-                <a:cs typeface="Adobe Clean"/>
-              </a:rPr>
-              <a:t>ll</a:t>
-            </a:r>
-            <a:r>
-              <a:rPr sz="1200" b="1" spc="-25">
-                <a:solidFill>
-                  <a:srgbClr val="FFFFFF"/>
-                </a:solidFill>
-                <a:latin typeface="Adobe Clean"/>
-                <a:cs typeface="Adobe Clean"/>
-              </a:rPr>
-              <a:t>e</a:t>
-            </a:r>
-            <a:r>
-              <a:rPr sz="1200" b="1" spc="-30">
-                <a:solidFill>
-                  <a:srgbClr val="FFFFFF"/>
-                </a:solidFill>
-                <a:latin typeface="Adobe Clean"/>
-                <a:cs typeface="Adobe Clean"/>
-              </a:rPr>
-              <a:t>l</a:t>
-            </a:r>
-            <a:r>
-              <a:rPr sz="1200" b="1" spc="-25">
-                <a:solidFill>
-                  <a:srgbClr val="FFFFFF"/>
-                </a:solidFill>
-                <a:latin typeface="Adobe Clean"/>
-                <a:cs typeface="Adobe Clean"/>
-              </a:rPr>
-              <a:t>e</a:t>
-            </a:r>
-            <a:r>
-              <a:rPr sz="1200" b="1">
-                <a:solidFill>
-                  <a:srgbClr val="FFFFFF"/>
-                </a:solidFill>
-                <a:latin typeface="Adobe Clean"/>
-                <a:cs typeface="Adobe Clean"/>
-              </a:rPr>
-              <a:t>d  </a:t>
-            </a:r>
-            <a:r>
-              <a:rPr sz="1200" b="1" spc="-25">
-                <a:solidFill>
-                  <a:srgbClr val="FFFFFF"/>
-                </a:solidFill>
-                <a:latin typeface="Adobe Clean"/>
-                <a:cs typeface="Adobe Clean"/>
-              </a:rPr>
-              <a:t>Expertise</a:t>
-            </a:r>
-            <a:endParaRPr sz="1200">
-              <a:latin typeface="Adobe Clean"/>
-              <a:cs typeface="Adobe Clean"/>
-            </a:endParaRPr>
           </a:p>
         </p:txBody>
       </p:sp>
@@ -11721,19 +10103,15 @@
               </a:spcBef>
             </a:pPr>
             <a:r>
-              <a:rPr lang="en-US" sz="1200" b="1" spc="-15">
+              <a:rPr lang="it-IT" sz="1200" b="1">
                 <a:solidFill>
                   <a:srgbClr val="FFFFFF"/>
                 </a:solidFill>
                 <a:latin typeface="Adobe Clean"/>
                 <a:cs typeface="Adobe Clean"/>
               </a:rPr>
-              <a:t>Accelerated Support</a:t>
+              <a:t>Supporto rapido</a:t>
             </a:r>
-            <a:endParaRPr sz="1200">
-              <a:latin typeface="Adobe Clean"/>
-              <a:cs typeface="Adobe Clean"/>
-            </a:endParaRPr>
           </a:p>
         </p:txBody>
       </p:sp>
@@ -11751,8 +10129,8 @@
         </p:nvSpPr>
         <p:spPr>
           <a:xfrm>
-            <a:off x="6624119" y="8543943"/>
-            <a:ext cx="510540" cy="385445"/>
+            <a:off x="6429819" y="8543969"/>
+            <a:ext cx="810895" cy="385445"/>
           </a:xfrm>
           <a:prstGeom prst="rect">
             <a:avLst/>
@@ -11773,109 +10151,15 @@
               </a:spcBef>
             </a:pPr>
             <a:r>
-              <a:rPr sz="1200" b="1" spc="-50">
+              <a:rPr lang="it-IT" sz="1200" b="1" dirty="0">
                 <a:solidFill>
                   <a:srgbClr val="FFFFFF"/>
                 </a:solidFill>
                 <a:latin typeface="Adobe Clean"/>
                 <a:cs typeface="Adobe Clean"/>
               </a:rPr>
-              <a:t>S</a:t>
+              <a:t>Consulenza strategica</a:t>
             </a:r>
-            <a:r>
-              <a:rPr sz="1200" b="1" spc="-20">
-                <a:solidFill>
-                  <a:srgbClr val="FFFFFF"/>
-                </a:solidFill>
-                <a:latin typeface="Adobe Clean"/>
-                <a:cs typeface="Adobe Clean"/>
-              </a:rPr>
-              <a:t>t</a:t>
-            </a:r>
-            <a:r>
-              <a:rPr sz="1200" b="1" spc="-75">
-                <a:solidFill>
-                  <a:srgbClr val="FFFFFF"/>
-                </a:solidFill>
-                <a:latin typeface="Adobe Clean"/>
-                <a:cs typeface="Adobe Clean"/>
-              </a:rPr>
-              <a:t>r</a:t>
-            </a:r>
-            <a:r>
-              <a:rPr sz="1200" b="1" spc="-90">
-                <a:solidFill>
-                  <a:srgbClr val="FFFFFF"/>
-                </a:solidFill>
-                <a:latin typeface="Adobe Clean"/>
-                <a:cs typeface="Adobe Clean"/>
-              </a:rPr>
-              <a:t>a</a:t>
-            </a:r>
-            <a:r>
-              <a:rPr sz="1200" b="1" spc="-55">
-                <a:solidFill>
-                  <a:srgbClr val="FFFFFF"/>
-                </a:solidFill>
-                <a:latin typeface="Adobe Clean"/>
-                <a:cs typeface="Adobe Clean"/>
-              </a:rPr>
-              <a:t>t</a:t>
-            </a:r>
-            <a:r>
-              <a:rPr sz="1200" b="1" spc="-100">
-                <a:solidFill>
-                  <a:srgbClr val="FFFFFF"/>
-                </a:solidFill>
-                <a:latin typeface="Adobe Clean"/>
-                <a:cs typeface="Adobe Clean"/>
-              </a:rPr>
-              <a:t>e</a:t>
-            </a:r>
-            <a:r>
-              <a:rPr sz="1200" b="1" spc="-80">
-                <a:solidFill>
-                  <a:srgbClr val="FFFFFF"/>
-                </a:solidFill>
-                <a:latin typeface="Adobe Clean"/>
-                <a:cs typeface="Adobe Clean"/>
-              </a:rPr>
-              <a:t>g</a:t>
-            </a:r>
-            <a:r>
-              <a:rPr sz="1200" b="1" spc="-35">
-                <a:solidFill>
-                  <a:srgbClr val="FFFFFF"/>
-                </a:solidFill>
-                <a:latin typeface="Adobe Clean"/>
-                <a:cs typeface="Adobe Clean"/>
-              </a:rPr>
-              <a:t>i</a:t>
-            </a:r>
-            <a:r>
-              <a:rPr sz="1200" b="1">
-                <a:solidFill>
-                  <a:srgbClr val="FFFFFF"/>
-                </a:solidFill>
-                <a:latin typeface="Adobe Clean"/>
-                <a:cs typeface="Adobe Clean"/>
-              </a:rPr>
-              <a:t>c  </a:t>
-            </a:r>
-            <a:r>
-              <a:rPr sz="1200" b="1" spc="-45">
-                <a:solidFill>
-                  <a:srgbClr val="FFFFFF"/>
-                </a:solidFill>
-                <a:latin typeface="Adobe Clean"/>
-                <a:cs typeface="Adobe Clean"/>
-              </a:rPr>
-              <a:t>Advice</a:t>
-            </a:r>
-            <a:endParaRPr sz="1200">
-              <a:latin typeface="Adobe Clean"/>
-              <a:cs typeface="Adobe Clean"/>
-            </a:endParaRPr>
           </a:p>
         </p:txBody>
       </p:sp>
@@ -11891,7 +10175,13 @@
           <p:cNvGraphicFramePr>
             <a:graphicFrameLocks noGrp="1"/>
           </p:cNvGraphicFramePr>
-          <p:nvPr/>
+          <p:nvPr>
+            <p:extLst>
+              <p:ext uri="{D42A27DB-BD31-4B8C-83A1-F6EECF244321}">
+                <p14:modId xmlns:p14="http://schemas.microsoft.com/office/powerpoint/2010/main" val="3878089471"/>
+              </p:ext>
+            </p:extLst>
+          </p:nvPr>
         </p:nvGraphicFramePr>
         <p:xfrm>
           <a:off x="194236" y="1059345"/>
@@ -11926,7 +10216,7 @@
                     <a:lstStyle/>
                     <a:p>
                       <a:r>
-                        <a:rPr lang="en-US" sz="1100" b="0">
+                        <a:rPr lang="it-IT" sz="1100" b="0">
                           <a:solidFill>
                             <a:schemeClr val="tx1"/>
                           </a:solidFill>
@@ -11937,14 +10227,6 @@
                         </a:rPr>
                         <a:t>Experience League</a:t>
                       </a:r>
-                      <a:endParaRPr lang="en-US" sz="1100" b="0">
-                        <a:solidFill>
-                          <a:schemeClr val="tx1"/>
-                        </a:solidFill>
-                        <a:latin typeface="Adobe Clean" panose="020B0503020404020204" pitchFamily="34" charset="0"/>
-                        <a:ea typeface="+mn-ea"/>
-                        <a:cs typeface="+mn-cs"/>
-                      </a:endParaRPr>
                     </a:p>
                   </a:txBody>
                   <a:tcPr marL="47625" marR="47625" marT="0" marB="0" anchor="ctr">
@@ -12018,7 +10300,7 @@
                         <a:defRPr/>
                       </a:pPr>
                       <a:r>
-                        <a:rPr lang="en-US" sz="1000" b="0" kern="1200">
+                        <a:rPr lang="it-IT" sz="1000" b="0" dirty="0">
                           <a:solidFill>
                             <a:srgbClr val="000000"/>
                           </a:solidFill>
@@ -12026,7 +10308,28 @@
                           <a:ea typeface="+mn-ea"/>
                           <a:cs typeface="+mn-cs"/>
                         </a:rPr>
-                        <a:t>Experience League is how Adobe helps businesses achieve the value they expect from their Adobe investment. It’s the unified place where customers can learn, connect, and grow along a personalized path to success that includes self-help tutorials, product documentation, instructor-led training, community and technical support. </a:t>
+                        <a:t>Con Experience League, Adobe aiuta le aziende a conseguire il valore che si aspettano dalle soluzioni Adobe in cui hanno investito. In questo portale unificato, puoi imparare, relazionarti con altri professionisti </a:t>
+                      </a:r>
+                      <a:br>
+                        <a:rPr lang="sk-SK" sz="1000" b="0" dirty="0">
+                          <a:solidFill>
+                            <a:srgbClr val="000000"/>
+                          </a:solidFill>
+                          <a:latin typeface="Adobe Clean Light" panose="020B0303020404020204" pitchFamily="34" charset="0"/>
+                          <a:ea typeface="+mn-ea"/>
+                          <a:cs typeface="+mn-cs"/>
+                        </a:rPr>
+                      </a:br>
+                      <a:r>
+                        <a:rPr lang="it-IT" sz="1000" b="0" dirty="0">
+                          <a:solidFill>
+                            <a:srgbClr val="000000"/>
+                          </a:solidFill>
+                          <a:latin typeface="Adobe Clean Light" panose="020B0303020404020204" pitchFamily="34" charset="0"/>
+                          <a:ea typeface="+mn-ea"/>
+                          <a:cs typeface="+mn-cs"/>
+                        </a:rPr>
+                        <a:t>e crescere seguendo un percorso personalizzato con tutorial, documentazione dei prodotti, formazione con istruttori, supporto tecnico e il sostegno dell’intera community. </a:t>
                       </a:r>
                     </a:p>
                   </a:txBody>
@@ -12108,39 +10411,28 @@
                         <a:defRPr/>
                       </a:pPr>
                       <a:r>
-                        <a:rPr lang="en-US" sz="1100">
+                        <a:rPr lang="it-IT" sz="1100">
                           <a:solidFill>
                             <a:schemeClr val="dk1"/>
                           </a:solidFill>
-                          <a:effectLst/>
                           <a:latin typeface="Adobe Clean" panose="020B0503020404020204" pitchFamily="34" charset="0"/>
                           <a:ea typeface="+mn-ea"/>
                           <a:cs typeface="+mn-cs"/>
                           <a:hlinkClick r:id="rId8"/>
                         </a:rPr>
-                        <a:t>Training</a:t>
+                        <a:t>Formazione</a:t>
                       </a:r>
                       <a:r>
-                        <a:rPr lang="en-US" sz="1100">
+                        <a:rPr lang="it-IT" sz="1100">
                           <a:solidFill>
                             <a:schemeClr val="dk1"/>
                           </a:solidFill>
-                          <a:effectLst/>
                           <a:latin typeface="Adobe Clean" panose="020B0503020404020204" pitchFamily="34" charset="0"/>
                           <a:ea typeface="+mn-ea"/>
                           <a:cs typeface="+mn-cs"/>
                         </a:rPr>
                         <a:t> </a:t>
                       </a:r>
-                      <a:endParaRPr lang="en-US" sz="1100">
-                        <a:solidFill>
-                          <a:schemeClr val="tx1"/>
-                        </a:solidFill>
-                        <a:effectLst/>
-                        <a:latin typeface="Adobe Clean" panose="020B0503020404020204" pitchFamily="34" charset="0"/>
-                        <a:ea typeface="+mn-ea"/>
-                        <a:cs typeface="+mn-cs"/>
-                      </a:endParaRPr>
                     </a:p>
                   </a:txBody>
                   <a:tcPr anchor="ctr">
@@ -12214,7 +10506,7 @@
                         <a:defRPr/>
                       </a:pPr>
                       <a:r>
-                        <a:rPr lang="en-US" sz="1000" kern="1200">
+                        <a:rPr lang="it-IT" sz="1000">
                           <a:solidFill>
                             <a:srgbClr val="000000"/>
                           </a:solidFill>
@@ -12222,7 +10514,7 @@
                           <a:ea typeface="+mn-ea"/>
                           <a:cs typeface="+mn-cs"/>
                         </a:rPr>
-                        <a:t>Adobe Digital Learning Services courses are accessible from Experience League. Learning courses integrate both on-demand and instructor-led lessons.  Here you can accrue skills that have recognized market value and position them to drive success in your organizations.</a:t>
+                        <a:t>I corsi Adobe Digital Learning Services sono accessibili da Experience League. I corsi di apprendimento comprendono lezioni sia on-demand che guidate da istruttori.  Potrai acquisire nuove competenze particolarmente ricercate nel settore e metterle in pratica nella tua organizzazione, per favorirne il successo.</a:t>
                       </a:r>
                     </a:p>
                   </a:txBody>
@@ -12304,27 +10596,17 @@
                         <a:defRPr/>
                       </a:pPr>
                       <a:r>
-                        <a:rPr lang="en-US" sz="1100">
+                        <a:rPr lang="it-IT" sz="1100">
                           <a:solidFill>
                             <a:schemeClr val="tx1"/>
                           </a:solidFill>
-                          <a:effectLst/>
                           <a:latin typeface="Adobe Clean" panose="020B0503020404020204" pitchFamily="34" charset="0"/>
                           <a:ea typeface="+mn-ea"/>
                           <a:cs typeface="+mn-cs"/>
                           <a:hlinkClick r:id="rId9"/>
                         </a:rPr>
-                        <a:t>Production Issues &amp; System Outages</a:t>
+                        <a:t>Problemi di produzione e interruzioni del sistema</a:t>
                       </a:r>
-                      <a:endParaRPr lang="en-US" sz="1100">
-                        <a:solidFill>
-                          <a:schemeClr val="tx1"/>
-                        </a:solidFill>
-                        <a:effectLst/>
-                        <a:latin typeface="Adobe Clean" panose="020B0503020404020204" pitchFamily="34" charset="0"/>
-                        <a:ea typeface="+mn-ea"/>
-                        <a:cs typeface="+mn-cs"/>
-                      </a:endParaRPr>
                     </a:p>
                   </a:txBody>
                   <a:tcPr anchor="ctr">
@@ -12398,7 +10680,7 @@
                         <a:defRPr/>
                       </a:pPr>
                       <a:r>
-                        <a:rPr lang="en-US" sz="1000" kern="1200">
+                        <a:rPr lang="it-IT" sz="1000" dirty="0">
                           <a:solidFill>
                             <a:srgbClr val="000000"/>
                           </a:solidFill>
@@ -12406,7 +10688,70 @@
                           <a:ea typeface="+mn-ea"/>
                           <a:cs typeface="+mn-cs"/>
                         </a:rPr>
-                        <a:t>Status.adobe.com conveys the health information of all Adobe products and services that are deployed in multi-tenant environments. Customers can choose their subscription preferences to get email notifications whenever Adobe creates, updates or resolves a product event. This can include scheduled maintenance or service issues of varying levels of severity. </a:t>
+                        <a:t>Status.adobe.com trasmette informazioni sullo stato di tutti i prodotti </a:t>
+                      </a:r>
+                      <a:br>
+                        <a:rPr lang="sk-SK" sz="1000" dirty="0">
+                          <a:solidFill>
+                            <a:srgbClr val="000000"/>
+                          </a:solidFill>
+                          <a:latin typeface="Adobe Clean Light" panose="020B0303020404020204" pitchFamily="34" charset="0"/>
+                          <a:ea typeface="+mn-ea"/>
+                          <a:cs typeface="+mn-cs"/>
+                        </a:rPr>
+                      </a:br>
+                      <a:r>
+                        <a:rPr lang="it-IT" sz="1000" dirty="0">
+                          <a:solidFill>
+                            <a:srgbClr val="000000"/>
+                          </a:solidFill>
+                          <a:latin typeface="Adobe Clean Light" panose="020B0303020404020204" pitchFamily="34" charset="0"/>
+                          <a:ea typeface="+mn-ea"/>
+                          <a:cs typeface="+mn-cs"/>
+                        </a:rPr>
+                        <a:t>e i servizi Adobe implementati in ambienti multi-tenant. Puoi scegliere se ricevere notifiche e-mail ogni volta che Adobe segnala, aggiorna </a:t>
+                      </a:r>
+                      <a:br>
+                        <a:rPr lang="sk-SK" sz="1000" dirty="0">
+                          <a:solidFill>
+                            <a:srgbClr val="000000"/>
+                          </a:solidFill>
+                          <a:latin typeface="Adobe Clean Light" panose="020B0303020404020204" pitchFamily="34" charset="0"/>
+                          <a:ea typeface="+mn-ea"/>
+                          <a:cs typeface="+mn-cs"/>
+                        </a:rPr>
+                      </a:br>
+                      <a:r>
+                        <a:rPr lang="it-IT" sz="1000" dirty="0">
+                          <a:solidFill>
+                            <a:srgbClr val="000000"/>
+                          </a:solidFill>
+                          <a:latin typeface="Adobe Clean Light" panose="020B0303020404020204" pitchFamily="34" charset="0"/>
+                          <a:ea typeface="+mn-ea"/>
+                          <a:cs typeface="+mn-cs"/>
+                        </a:rPr>
+                        <a:t>o risolve un problema relativo a un prodotto. Vengono segnalate </a:t>
+                      </a:r>
+                      <a:br>
+                        <a:rPr lang="sk-SK" sz="1000" dirty="0">
+                          <a:solidFill>
+                            <a:srgbClr val="000000"/>
+                          </a:solidFill>
+                          <a:latin typeface="Adobe Clean Light" panose="020B0303020404020204" pitchFamily="34" charset="0"/>
+                          <a:ea typeface="+mn-ea"/>
+                          <a:cs typeface="+mn-cs"/>
+                        </a:rPr>
+                      </a:br>
+                      <a:r>
+                        <a:rPr lang="it-IT" sz="1000" dirty="0">
+                          <a:solidFill>
+                            <a:srgbClr val="000000"/>
+                          </a:solidFill>
+                          <a:latin typeface="Adobe Clean Light" panose="020B0303020404020204" pitchFamily="34" charset="0"/>
+                          <a:ea typeface="+mn-ea"/>
+                          <a:cs typeface="+mn-cs"/>
+                        </a:rPr>
+                        <a:t>ad esempio le interruzioni per manutenzione programmata o problemi relativi ai servizi con diversi livelli di gravità. </a:t>
                       </a:r>
                     </a:p>
                   </a:txBody>
@@ -12488,27 +10833,17 @@
                         <a:defRPr/>
                       </a:pPr>
                       <a:r>
-                        <a:rPr lang="en-US" sz="1100" b="0" i="0">
+                        <a:rPr lang="it-IT" sz="1100" b="0" i="0">
                           <a:solidFill>
                             <a:schemeClr val="dk1"/>
                           </a:solidFill>
-                          <a:effectLst/>
                           <a:latin typeface="Adobe Clean" panose="020B0503020404020204" pitchFamily="34" charset="0"/>
                           <a:ea typeface="+mn-ea"/>
                           <a:cs typeface="+mn-cs"/>
-                          <a:hlinkClick r:id="rId10" tooltip="https://helpx.adobe.com/support/programs/enterprise-support-programs/premier-support-business.html"/>
+                          <a:hlinkClick r:id="rId10" tooltip="https://helpx.adobe.com/it/support/programs/enterprise-support-programs/premier-support-business.html"/>
                         </a:rPr>
-                        <a:t>Business Support Website</a:t>
+                        <a:t>Sito del supporto Business</a:t>
                       </a:r>
-                      <a:endParaRPr lang="en-US" sz="1100" b="0" i="0">
-                        <a:solidFill>
-                          <a:schemeClr val="dk1"/>
-                        </a:solidFill>
-                        <a:effectLst/>
-                        <a:latin typeface="Adobe Clean" panose="020B0503020404020204" pitchFamily="34" charset="0"/>
-                        <a:ea typeface="+mn-ea"/>
-                        <a:cs typeface="+mn-cs"/>
-                      </a:endParaRPr>
                     </a:p>
                   </a:txBody>
                   <a:tcPr anchor="ctr">
@@ -12565,7 +10900,7 @@
                     <a:lstStyle/>
                     <a:p>
                       <a:r>
-                        <a:rPr lang="en-US" sz="1000" kern="1200">
+                        <a:rPr lang="it-IT" sz="1000">
                           <a:solidFill>
                             <a:srgbClr val="000000"/>
                           </a:solidFill>
@@ -12573,7 +10908,7 @@
                           <a:ea typeface="+mn-ea"/>
                           <a:cs typeface="+mn-cs"/>
                         </a:rPr>
-                        <a:t>Adobe Business Support website</a:t>
+                        <a:t>Sito del supporto Business di Adobe</a:t>
                       </a:r>
                     </a:p>
                   </a:txBody>
@@ -12655,27 +10990,17 @@
                         <a:defRPr/>
                       </a:pPr>
                       <a:r>
-                        <a:rPr lang="en-US" sz="1100">
+                        <a:rPr lang="it-IT" sz="1100">
                           <a:solidFill>
                             <a:schemeClr val="tx1"/>
                           </a:solidFill>
-                          <a:effectLst/>
                           <a:latin typeface="Adobe Clean" panose="020B0503020404020204" pitchFamily="34" charset="0"/>
                           <a:ea typeface="+mn-ea"/>
                           <a:cs typeface="+mn-cs"/>
                           <a:hlinkClick r:id="rId11"/>
                         </a:rPr>
-                        <a:t>Terms and Conditions</a:t>
+                        <a:t>Termini e condizioni</a:t>
                       </a:r>
-                      <a:endParaRPr lang="en-US" sz="1100">
-                        <a:solidFill>
-                          <a:schemeClr val="tx1"/>
-                        </a:solidFill>
-                        <a:effectLst/>
-                        <a:latin typeface="Adobe Clean" panose="020B0503020404020204" pitchFamily="34" charset="0"/>
-                        <a:ea typeface="+mn-ea"/>
-                        <a:cs typeface="+mn-cs"/>
-                      </a:endParaRPr>
                     </a:p>
                   </a:txBody>
                   <a:tcPr anchor="ctr">
@@ -12732,7 +11057,7 @@
                     <a:lstStyle/>
                     <a:p>
                       <a:r>
-                        <a:rPr lang="en-US" sz="1000" kern="1200">
+                        <a:rPr lang="it-IT" sz="1000" dirty="0">
                           <a:solidFill>
                             <a:srgbClr val="000000"/>
                           </a:solidFill>
@@ -12740,7 +11065,7 @@
                           <a:ea typeface="+mn-ea"/>
                           <a:cs typeface="+mn-cs"/>
                         </a:rPr>
-                        <a:t>Terms and conditions detailing Support Services offerings</a:t>
+                        <a:t>Termini e condizioni che descrivono i servizi di supporto disponibili</a:t>
                       </a:r>
                     </a:p>
                   </a:txBody>
@@ -13511,6 +11836,12 @@
 </file>
 
 <file path=customXml/item1.xml><?xml version="1.0" encoding="utf-8"?>
+<p:properties xmlns:p="http://schemas.microsoft.com/office/2006/metadata/properties" xmlns:xsi="http://www.w3.org/2001/XMLSchema-instance" xmlns:pc="http://schemas.microsoft.com/office/infopath/2007/PartnerControls">
+  <documentManagement/>
+</p:properties>
+</file>
+
+<file path=customXml/item2.xml><?xml version="1.0" encoding="utf-8"?>
 <ct:contentTypeSchema xmlns:ct="http://schemas.microsoft.com/office/2006/metadata/contentType" xmlns:ma="http://schemas.microsoft.com/office/2006/metadata/properties/metaAttributes" ct:_="" ma:_="" ma:contentTypeName="Document" ma:contentTypeID="0x010100E783BF6876BCC646A459363AF21A7736" ma:contentTypeVersion="10" ma:contentTypeDescription="Create a new document." ma:contentTypeScope="" ma:versionID="c4ffda7f4f415767600769e454c2ea87">
   <xsd:schema xmlns:xsd="http://www.w3.org/2001/XMLSchema" xmlns:xs="http://www.w3.org/2001/XMLSchema" xmlns:p="http://schemas.microsoft.com/office/2006/metadata/properties" xmlns:ns2="8a053bff-88be-49e4-9a87-e748e18b8b62" xmlns:ns3="6c8368ec-3776-49b5-a5bb-90648cf9530f" targetNamespace="http://schemas.microsoft.com/office/2006/metadata/properties" ma:root="true" ma:fieldsID="df3ec33bccc23e23bce7bc897fad43d1" ns2:_="" ns3:_="">
     <xsd:import namespace="8a053bff-88be-49e4-9a87-e748e18b8b62"/>
@@ -13715,12 +12046,6 @@
 </ct:contentTypeSchema>
 </file>
 
-<file path=customXml/item2.xml><?xml version="1.0" encoding="utf-8"?>
-<p:properties xmlns:p="http://schemas.microsoft.com/office/2006/metadata/properties" xmlns:xsi="http://www.w3.org/2001/XMLSchema-instance" xmlns:pc="http://schemas.microsoft.com/office/infopath/2007/PartnerControls">
-  <documentManagement/>
-</p:properties>
-</file>
-
 <file path=customXml/item3.xml><?xml version="1.0" encoding="utf-8"?>
 <?mso-contentType ?>
 <FormTemplates xmlns="http://schemas.microsoft.com/sharepoint/v3/contenttype/forms">
@@ -13731,6 +12056,15 @@
 </file>
 
 <file path=customXml/itemProps1.xml><?xml version="1.0" encoding="utf-8"?>
+<ds:datastoreItem xmlns:ds="http://schemas.openxmlformats.org/officeDocument/2006/customXml" ds:itemID="{10FC3CAF-E6F1-40E3-87D4-6B781C97D6B4}">
+  <ds:schemaRefs>
+    <ds:schemaRef ds:uri="http://schemas.microsoft.com/office/2006/metadata/properties"/>
+    <ds:schemaRef ds:uri="http://schemas.microsoft.com/office/infopath/2007/PartnerControls"/>
+  </ds:schemaRefs>
+</ds:datastoreItem>
+</file>
+
+<file path=customXml/itemProps2.xml><?xml version="1.0" encoding="utf-8"?>
 <ds:datastoreItem xmlns:ds="http://schemas.openxmlformats.org/officeDocument/2006/customXml" ds:itemID="{E0DB8BDF-6DA8-4ABC-A3CA-043AFD674CFC}">
   <ds:schemaRefs>
     <ds:schemaRef ds:uri="6c8368ec-3776-49b5-a5bb-90648cf9530f"/>
@@ -13749,15 +12083,6 @@
 </ds:datastoreItem>
 </file>
 
-<file path=customXml/itemProps2.xml><?xml version="1.0" encoding="utf-8"?>
-<ds:datastoreItem xmlns:ds="http://schemas.openxmlformats.org/officeDocument/2006/customXml" ds:itemID="{10FC3CAF-E6F1-40E3-87D4-6B781C97D6B4}">
-  <ds:schemaRefs>
-    <ds:schemaRef ds:uri="http://schemas.microsoft.com/office/2006/metadata/properties"/>
-    <ds:schemaRef ds:uri="http://schemas.microsoft.com/office/infopath/2007/PartnerControls"/>
-  </ds:schemaRefs>
-</ds:datastoreItem>
-</file>
-
 <file path=customXml/itemProps3.xml><?xml version="1.0" encoding="utf-8"?>
 <ds:datastoreItem xmlns:ds="http://schemas.openxmlformats.org/officeDocument/2006/customXml" ds:itemID="{95AE3B0B-E909-400C-B0B3-909FB50E07DE}">
   <ds:schemaRefs>

</xml_diff>